<commit_message>
added diagram, updated text
</commit_message>
<xml_diff>
--- a/Celebrity detection using AWS Rekognition.pptx
+++ b/Celebrity detection using AWS Rekognition.pptx
@@ -4,13 +4,17 @@
   <p:sldMasterIdLst>
     <p:sldMasterId id="2147483648" r:id="rId1"/>
   </p:sldMasterIdLst>
+  <p:notesMasterIdLst>
+    <p:notesMasterId r:id="rId9"/>
+  </p:notesMasterIdLst>
   <p:sldIdLst>
     <p:sldId id="256" r:id="rId2"/>
     <p:sldId id="260" r:id="rId3"/>
     <p:sldId id="261" r:id="rId4"/>
-    <p:sldId id="259" r:id="rId5"/>
-    <p:sldId id="258" r:id="rId6"/>
-    <p:sldId id="257" r:id="rId7"/>
+    <p:sldId id="262" r:id="rId5"/>
+    <p:sldId id="259" r:id="rId6"/>
+    <p:sldId id="258" r:id="rId7"/>
+    <p:sldId id="257" r:id="rId8"/>
   </p:sldIdLst>
   <p:sldSz cx="12192000" cy="6858000"/>
   <p:notesSz cx="6858000" cy="9144000"/>
@@ -121,6 +125,824 @@
 <p1510:revInfo xmlns:a="http://schemas.openxmlformats.org/drawingml/2006/main" xmlns:r="http://schemas.openxmlformats.org/officeDocument/2006/relationships" xmlns:p1510="http://schemas.microsoft.com/office/powerpoint/2015/10/main"/>
 </file>
 
+<file path=ppt/notesMasters/notesMaster1.xml><?xml version="1.0" encoding="utf-8"?>
+<p:notesMaster xmlns:a="http://schemas.openxmlformats.org/drawingml/2006/main" xmlns:r="http://schemas.openxmlformats.org/officeDocument/2006/relationships" xmlns:p="http://schemas.openxmlformats.org/presentationml/2006/main">
+  <p:cSld>
+    <p:bg>
+      <p:bgRef idx="1001">
+        <a:schemeClr val="bg1"/>
+      </p:bgRef>
+    </p:bg>
+    <p:spTree>
+      <p:nvGrpSpPr>
+        <p:cNvPr id="1" name=""/>
+        <p:cNvGrpSpPr/>
+        <p:nvPr/>
+      </p:nvGrpSpPr>
+      <p:grpSpPr>
+        <a:xfrm>
+          <a:off x="0" y="0"/>
+          <a:ext cx="0" cy="0"/>
+          <a:chOff x="0" y="0"/>
+          <a:chExt cx="0" cy="0"/>
+        </a:xfrm>
+      </p:grpSpPr>
+      <p:sp>
+        <p:nvSpPr>
+          <p:cNvPr id="2" name="Header Placeholder 1"/>
+          <p:cNvSpPr>
+            <a:spLocks noGrp="1"/>
+          </p:cNvSpPr>
+          <p:nvPr>
+            <p:ph type="hdr" sz="quarter"/>
+          </p:nvPr>
+        </p:nvSpPr>
+        <p:spPr>
+          <a:xfrm>
+            <a:off x="0" y="0"/>
+            <a:ext cx="2971800" cy="458788"/>
+          </a:xfrm>
+          <a:prstGeom prst="rect">
+            <a:avLst/>
+          </a:prstGeom>
+        </p:spPr>
+        <p:txBody>
+          <a:bodyPr vert="horz" lIns="91440" tIns="45720" rIns="91440" bIns="45720" rtlCol="0"/>
+          <a:lstStyle>
+            <a:lvl1pPr algn="l">
+              <a:defRPr sz="1200"/>
+            </a:lvl1pPr>
+          </a:lstStyle>
+          <a:p>
+            <a:endParaRPr lang="en-US"/>
+          </a:p>
+        </p:txBody>
+      </p:sp>
+      <p:sp>
+        <p:nvSpPr>
+          <p:cNvPr id="3" name="Date Placeholder 2"/>
+          <p:cNvSpPr>
+            <a:spLocks noGrp="1"/>
+          </p:cNvSpPr>
+          <p:nvPr>
+            <p:ph type="dt" idx="1"/>
+          </p:nvPr>
+        </p:nvSpPr>
+        <p:spPr>
+          <a:xfrm>
+            <a:off x="3884613" y="0"/>
+            <a:ext cx="2971800" cy="458788"/>
+          </a:xfrm>
+          <a:prstGeom prst="rect">
+            <a:avLst/>
+          </a:prstGeom>
+        </p:spPr>
+        <p:txBody>
+          <a:bodyPr vert="horz" lIns="91440" tIns="45720" rIns="91440" bIns="45720" rtlCol="0"/>
+          <a:lstStyle>
+            <a:lvl1pPr algn="r">
+              <a:defRPr sz="1200"/>
+            </a:lvl1pPr>
+          </a:lstStyle>
+          <a:p>
+            <a:fld id="{220051E5-D995-43FC-85F2-391EBF7A46F3}" type="datetimeFigureOut">
+              <a:rPr lang="en-US" smtClean="0"/>
+              <a:t>6/19/2017</a:t>
+            </a:fld>
+            <a:endParaRPr lang="en-US"/>
+          </a:p>
+        </p:txBody>
+      </p:sp>
+      <p:sp>
+        <p:nvSpPr>
+          <p:cNvPr id="4" name="Slide Image Placeholder 3"/>
+          <p:cNvSpPr>
+            <a:spLocks noGrp="1" noRot="1" noChangeAspect="1"/>
+          </p:cNvSpPr>
+          <p:nvPr>
+            <p:ph type="sldImg" idx="2"/>
+          </p:nvPr>
+        </p:nvSpPr>
+        <p:spPr>
+          <a:xfrm>
+            <a:off x="685800" y="1143000"/>
+            <a:ext cx="5486400" cy="3086100"/>
+          </a:xfrm>
+          <a:prstGeom prst="rect">
+            <a:avLst/>
+          </a:prstGeom>
+          <a:noFill/>
+          <a:ln w="12700">
+            <a:solidFill>
+              <a:prstClr val="black"/>
+            </a:solidFill>
+          </a:ln>
+        </p:spPr>
+        <p:txBody>
+          <a:bodyPr vert="horz" lIns="91440" tIns="45720" rIns="91440" bIns="45720" rtlCol="0" anchor="ctr"/>
+          <a:lstStyle/>
+          <a:p>
+            <a:endParaRPr lang="en-US"/>
+          </a:p>
+        </p:txBody>
+      </p:sp>
+      <p:sp>
+        <p:nvSpPr>
+          <p:cNvPr id="5" name="Notes Placeholder 4"/>
+          <p:cNvSpPr>
+            <a:spLocks noGrp="1"/>
+          </p:cNvSpPr>
+          <p:nvPr>
+            <p:ph type="body" sz="quarter" idx="3"/>
+          </p:nvPr>
+        </p:nvSpPr>
+        <p:spPr>
+          <a:xfrm>
+            <a:off x="685800" y="4400550"/>
+            <a:ext cx="5486400" cy="3600450"/>
+          </a:xfrm>
+          <a:prstGeom prst="rect">
+            <a:avLst/>
+          </a:prstGeom>
+        </p:spPr>
+        <p:txBody>
+          <a:bodyPr vert="horz" lIns="91440" tIns="45720" rIns="91440" bIns="45720" rtlCol="0"/>
+          <a:lstStyle/>
+          <a:p>
+            <a:pPr lvl="0"/>
+            <a:r>
+              <a:rPr lang="en-US"/>
+              <a:t>Edit Master text styles</a:t>
+            </a:r>
+          </a:p>
+          <a:p>
+            <a:pPr lvl="1"/>
+            <a:r>
+              <a:rPr lang="en-US"/>
+              <a:t>Second level</a:t>
+            </a:r>
+          </a:p>
+          <a:p>
+            <a:pPr lvl="2"/>
+            <a:r>
+              <a:rPr lang="en-US"/>
+              <a:t>Third level</a:t>
+            </a:r>
+          </a:p>
+          <a:p>
+            <a:pPr lvl="3"/>
+            <a:r>
+              <a:rPr lang="en-US"/>
+              <a:t>Fourth level</a:t>
+            </a:r>
+          </a:p>
+          <a:p>
+            <a:pPr lvl="4"/>
+            <a:r>
+              <a:rPr lang="en-US"/>
+              <a:t>Fifth level</a:t>
+            </a:r>
+          </a:p>
+        </p:txBody>
+      </p:sp>
+      <p:sp>
+        <p:nvSpPr>
+          <p:cNvPr id="6" name="Footer Placeholder 5"/>
+          <p:cNvSpPr>
+            <a:spLocks noGrp="1"/>
+          </p:cNvSpPr>
+          <p:nvPr>
+            <p:ph type="ftr" sz="quarter" idx="4"/>
+          </p:nvPr>
+        </p:nvSpPr>
+        <p:spPr>
+          <a:xfrm>
+            <a:off x="0" y="8685213"/>
+            <a:ext cx="2971800" cy="458787"/>
+          </a:xfrm>
+          <a:prstGeom prst="rect">
+            <a:avLst/>
+          </a:prstGeom>
+        </p:spPr>
+        <p:txBody>
+          <a:bodyPr vert="horz" lIns="91440" tIns="45720" rIns="91440" bIns="45720" rtlCol="0" anchor="b"/>
+          <a:lstStyle>
+            <a:lvl1pPr algn="l">
+              <a:defRPr sz="1200"/>
+            </a:lvl1pPr>
+          </a:lstStyle>
+          <a:p>
+            <a:endParaRPr lang="en-US"/>
+          </a:p>
+        </p:txBody>
+      </p:sp>
+      <p:sp>
+        <p:nvSpPr>
+          <p:cNvPr id="7" name="Slide Number Placeholder 6"/>
+          <p:cNvSpPr>
+            <a:spLocks noGrp="1"/>
+          </p:cNvSpPr>
+          <p:nvPr>
+            <p:ph type="sldNum" sz="quarter" idx="5"/>
+          </p:nvPr>
+        </p:nvSpPr>
+        <p:spPr>
+          <a:xfrm>
+            <a:off x="3884613" y="8685213"/>
+            <a:ext cx="2971800" cy="458787"/>
+          </a:xfrm>
+          <a:prstGeom prst="rect">
+            <a:avLst/>
+          </a:prstGeom>
+        </p:spPr>
+        <p:txBody>
+          <a:bodyPr vert="horz" lIns="91440" tIns="45720" rIns="91440" bIns="45720" rtlCol="0" anchor="b"/>
+          <a:lstStyle>
+            <a:lvl1pPr algn="r">
+              <a:defRPr sz="1200"/>
+            </a:lvl1pPr>
+          </a:lstStyle>
+          <a:p>
+            <a:fld id="{A43A9EC1-7D08-4D00-B928-81A7176B4734}" type="slidenum">
+              <a:rPr lang="en-US" smtClean="0"/>
+              <a:t>‹#›</a:t>
+            </a:fld>
+            <a:endParaRPr lang="en-US"/>
+          </a:p>
+        </p:txBody>
+      </p:sp>
+    </p:spTree>
+    <p:extLst>
+      <p:ext uri="{BB962C8B-B14F-4D97-AF65-F5344CB8AC3E}">
+        <p14:creationId xmlns:p14="http://schemas.microsoft.com/office/powerpoint/2010/main" val="1133476401"/>
+      </p:ext>
+    </p:extLst>
+  </p:cSld>
+  <p:clrMap bg1="lt1" tx1="dk1" bg2="lt2" tx2="dk2" accent1="accent1" accent2="accent2" accent3="accent3" accent4="accent4" accent5="accent5" accent6="accent6" hlink="hlink" folHlink="folHlink"/>
+  <p:notesStyle>
+    <a:lvl1pPr marL="0" algn="l" defTabSz="914400" rtl="0" eaLnBrk="1" latinLnBrk="0" hangingPunct="1">
+      <a:defRPr sz="1200" kern="1200">
+        <a:solidFill>
+          <a:schemeClr val="tx1"/>
+        </a:solidFill>
+        <a:latin typeface="+mn-lt"/>
+        <a:ea typeface="+mn-ea"/>
+        <a:cs typeface="+mn-cs"/>
+      </a:defRPr>
+    </a:lvl1pPr>
+    <a:lvl2pPr marL="457200" algn="l" defTabSz="914400" rtl="0" eaLnBrk="1" latinLnBrk="0" hangingPunct="1">
+      <a:defRPr sz="1200" kern="1200">
+        <a:solidFill>
+          <a:schemeClr val="tx1"/>
+        </a:solidFill>
+        <a:latin typeface="+mn-lt"/>
+        <a:ea typeface="+mn-ea"/>
+        <a:cs typeface="+mn-cs"/>
+      </a:defRPr>
+    </a:lvl2pPr>
+    <a:lvl3pPr marL="914400" algn="l" defTabSz="914400" rtl="0" eaLnBrk="1" latinLnBrk="0" hangingPunct="1">
+      <a:defRPr sz="1200" kern="1200">
+        <a:solidFill>
+          <a:schemeClr val="tx1"/>
+        </a:solidFill>
+        <a:latin typeface="+mn-lt"/>
+        <a:ea typeface="+mn-ea"/>
+        <a:cs typeface="+mn-cs"/>
+      </a:defRPr>
+    </a:lvl3pPr>
+    <a:lvl4pPr marL="1371600" algn="l" defTabSz="914400" rtl="0" eaLnBrk="1" latinLnBrk="0" hangingPunct="1">
+      <a:defRPr sz="1200" kern="1200">
+        <a:solidFill>
+          <a:schemeClr val="tx1"/>
+        </a:solidFill>
+        <a:latin typeface="+mn-lt"/>
+        <a:ea typeface="+mn-ea"/>
+        <a:cs typeface="+mn-cs"/>
+      </a:defRPr>
+    </a:lvl4pPr>
+    <a:lvl5pPr marL="1828800" algn="l" defTabSz="914400" rtl="0" eaLnBrk="1" latinLnBrk="0" hangingPunct="1">
+      <a:defRPr sz="1200" kern="1200">
+        <a:solidFill>
+          <a:schemeClr val="tx1"/>
+        </a:solidFill>
+        <a:latin typeface="+mn-lt"/>
+        <a:ea typeface="+mn-ea"/>
+        <a:cs typeface="+mn-cs"/>
+      </a:defRPr>
+    </a:lvl5pPr>
+    <a:lvl6pPr marL="2286000" algn="l" defTabSz="914400" rtl="0" eaLnBrk="1" latinLnBrk="0" hangingPunct="1">
+      <a:defRPr sz="1200" kern="1200">
+        <a:solidFill>
+          <a:schemeClr val="tx1"/>
+        </a:solidFill>
+        <a:latin typeface="+mn-lt"/>
+        <a:ea typeface="+mn-ea"/>
+        <a:cs typeface="+mn-cs"/>
+      </a:defRPr>
+    </a:lvl6pPr>
+    <a:lvl7pPr marL="2743200" algn="l" defTabSz="914400" rtl="0" eaLnBrk="1" latinLnBrk="0" hangingPunct="1">
+      <a:defRPr sz="1200" kern="1200">
+        <a:solidFill>
+          <a:schemeClr val="tx1"/>
+        </a:solidFill>
+        <a:latin typeface="+mn-lt"/>
+        <a:ea typeface="+mn-ea"/>
+        <a:cs typeface="+mn-cs"/>
+      </a:defRPr>
+    </a:lvl7pPr>
+    <a:lvl8pPr marL="3200400" algn="l" defTabSz="914400" rtl="0" eaLnBrk="1" latinLnBrk="0" hangingPunct="1">
+      <a:defRPr sz="1200" kern="1200">
+        <a:solidFill>
+          <a:schemeClr val="tx1"/>
+        </a:solidFill>
+        <a:latin typeface="+mn-lt"/>
+        <a:ea typeface="+mn-ea"/>
+        <a:cs typeface="+mn-cs"/>
+      </a:defRPr>
+    </a:lvl8pPr>
+    <a:lvl9pPr marL="3657600" algn="l" defTabSz="914400" rtl="0" eaLnBrk="1" latinLnBrk="0" hangingPunct="1">
+      <a:defRPr sz="1200" kern="1200">
+        <a:solidFill>
+          <a:schemeClr val="tx1"/>
+        </a:solidFill>
+        <a:latin typeface="+mn-lt"/>
+        <a:ea typeface="+mn-ea"/>
+        <a:cs typeface="+mn-cs"/>
+      </a:defRPr>
+    </a:lvl9pPr>
+  </p:notesStyle>
+</p:notesMaster>
+</file>
+
+<file path=ppt/notesSlides/notesSlide1.xml><?xml version="1.0" encoding="utf-8"?>
+<p:notes xmlns:a="http://schemas.openxmlformats.org/drawingml/2006/main" xmlns:r="http://schemas.openxmlformats.org/officeDocument/2006/relationships" xmlns:p="http://schemas.openxmlformats.org/presentationml/2006/main">
+  <p:cSld>
+    <p:spTree>
+      <p:nvGrpSpPr>
+        <p:cNvPr id="1" name=""/>
+        <p:cNvGrpSpPr/>
+        <p:nvPr/>
+      </p:nvGrpSpPr>
+      <p:grpSpPr>
+        <a:xfrm>
+          <a:off x="0" y="0"/>
+          <a:ext cx="0" cy="0"/>
+          <a:chOff x="0" y="0"/>
+          <a:chExt cx="0" cy="0"/>
+        </a:xfrm>
+      </p:grpSpPr>
+      <p:sp>
+        <p:nvSpPr>
+          <p:cNvPr id="2" name="Slide Image Placeholder 1"/>
+          <p:cNvSpPr>
+            <a:spLocks noGrp="1" noRot="1" noChangeAspect="1"/>
+          </p:cNvSpPr>
+          <p:nvPr>
+            <p:ph type="sldImg"/>
+          </p:nvPr>
+        </p:nvSpPr>
+        <p:spPr/>
+      </p:sp>
+      <p:sp>
+        <p:nvSpPr>
+          <p:cNvPr id="3" name="Notes Placeholder 2"/>
+          <p:cNvSpPr>
+            <a:spLocks noGrp="1"/>
+          </p:cNvSpPr>
+          <p:nvPr>
+            <p:ph type="body" idx="1"/>
+          </p:nvPr>
+        </p:nvSpPr>
+        <p:spPr/>
+        <p:txBody>
+          <a:bodyPr/>
+          <a:lstStyle/>
+          <a:p>
+            <a:r>
+              <a:rPr lang="en-US" dirty="0" err="1"/>
+              <a:t>recognizeCelebrities</a:t>
+            </a:r>
+            <a:r>
+              <a:rPr lang="en-US" dirty="0"/>
+              <a:t> was not in AWS CLI, turned out I need to update AWS CLI.</a:t>
+            </a:r>
+          </a:p>
+        </p:txBody>
+      </p:sp>
+      <p:sp>
+        <p:nvSpPr>
+          <p:cNvPr id="4" name="Slide Number Placeholder 3"/>
+          <p:cNvSpPr>
+            <a:spLocks noGrp="1"/>
+          </p:cNvSpPr>
+          <p:nvPr>
+            <p:ph type="sldNum" sz="quarter" idx="10"/>
+          </p:nvPr>
+        </p:nvSpPr>
+        <p:spPr/>
+        <p:txBody>
+          <a:bodyPr/>
+          <a:lstStyle/>
+          <a:p>
+            <a:fld id="{A43A9EC1-7D08-4D00-B928-81A7176B4734}" type="slidenum">
+              <a:rPr lang="en-US" smtClean="0"/>
+              <a:t>2</a:t>
+            </a:fld>
+            <a:endParaRPr lang="en-US"/>
+          </a:p>
+        </p:txBody>
+      </p:sp>
+    </p:spTree>
+    <p:extLst>
+      <p:ext uri="{BB962C8B-B14F-4D97-AF65-F5344CB8AC3E}">
+        <p14:creationId xmlns:p14="http://schemas.microsoft.com/office/powerpoint/2010/main" val="1774604595"/>
+      </p:ext>
+    </p:extLst>
+  </p:cSld>
+  <p:clrMapOvr>
+    <a:masterClrMapping/>
+  </p:clrMapOvr>
+</p:notes>
+</file>
+
+<file path=ppt/notesSlides/notesSlide2.xml><?xml version="1.0" encoding="utf-8"?>
+<p:notes xmlns:a="http://schemas.openxmlformats.org/drawingml/2006/main" xmlns:r="http://schemas.openxmlformats.org/officeDocument/2006/relationships" xmlns:p="http://schemas.openxmlformats.org/presentationml/2006/main">
+  <p:cSld>
+    <p:spTree>
+      <p:nvGrpSpPr>
+        <p:cNvPr id="1" name=""/>
+        <p:cNvGrpSpPr/>
+        <p:nvPr/>
+      </p:nvGrpSpPr>
+      <p:grpSpPr>
+        <a:xfrm>
+          <a:off x="0" y="0"/>
+          <a:ext cx="0" cy="0"/>
+          <a:chOff x="0" y="0"/>
+          <a:chExt cx="0" cy="0"/>
+        </a:xfrm>
+      </p:grpSpPr>
+      <p:sp>
+        <p:nvSpPr>
+          <p:cNvPr id="2" name="Slide Image Placeholder 1"/>
+          <p:cNvSpPr>
+            <a:spLocks noGrp="1" noRot="1" noChangeAspect="1"/>
+          </p:cNvSpPr>
+          <p:nvPr>
+            <p:ph type="sldImg"/>
+          </p:nvPr>
+        </p:nvSpPr>
+        <p:spPr/>
+      </p:sp>
+      <p:sp>
+        <p:nvSpPr>
+          <p:cNvPr id="3" name="Notes Placeholder 2"/>
+          <p:cNvSpPr>
+            <a:spLocks noGrp="1"/>
+          </p:cNvSpPr>
+          <p:nvPr>
+            <p:ph type="body" idx="1"/>
+          </p:nvPr>
+        </p:nvSpPr>
+        <p:spPr/>
+        <p:txBody>
+          <a:bodyPr/>
+          <a:lstStyle/>
+          <a:p>
+            <a:endParaRPr lang="en-US" dirty="0"/>
+          </a:p>
+        </p:txBody>
+      </p:sp>
+      <p:sp>
+        <p:nvSpPr>
+          <p:cNvPr id="4" name="Slide Number Placeholder 3"/>
+          <p:cNvSpPr>
+            <a:spLocks noGrp="1"/>
+          </p:cNvSpPr>
+          <p:nvPr>
+            <p:ph type="sldNum" sz="quarter" idx="10"/>
+          </p:nvPr>
+        </p:nvSpPr>
+        <p:spPr/>
+        <p:txBody>
+          <a:bodyPr/>
+          <a:lstStyle/>
+          <a:p>
+            <a:fld id="{A43A9EC1-7D08-4D00-B928-81A7176B4734}" type="slidenum">
+              <a:rPr lang="en-US" smtClean="0"/>
+              <a:t>3</a:t>
+            </a:fld>
+            <a:endParaRPr lang="en-US"/>
+          </a:p>
+        </p:txBody>
+      </p:sp>
+    </p:spTree>
+    <p:extLst>
+      <p:ext uri="{BB962C8B-B14F-4D97-AF65-F5344CB8AC3E}">
+        <p14:creationId xmlns:p14="http://schemas.microsoft.com/office/powerpoint/2010/main" val="2611130304"/>
+      </p:ext>
+    </p:extLst>
+  </p:cSld>
+  <p:clrMapOvr>
+    <a:masterClrMapping/>
+  </p:clrMapOvr>
+</p:notes>
+</file>
+
+<file path=ppt/notesSlides/notesSlide3.xml><?xml version="1.0" encoding="utf-8"?>
+<p:notes xmlns:a="http://schemas.openxmlformats.org/drawingml/2006/main" xmlns:r="http://schemas.openxmlformats.org/officeDocument/2006/relationships" xmlns:p="http://schemas.openxmlformats.org/presentationml/2006/main">
+  <p:cSld>
+    <p:spTree>
+      <p:nvGrpSpPr>
+        <p:cNvPr id="1" name=""/>
+        <p:cNvGrpSpPr/>
+        <p:nvPr/>
+      </p:nvGrpSpPr>
+      <p:grpSpPr>
+        <a:xfrm>
+          <a:off x="0" y="0"/>
+          <a:ext cx="0" cy="0"/>
+          <a:chOff x="0" y="0"/>
+          <a:chExt cx="0" cy="0"/>
+        </a:xfrm>
+      </p:grpSpPr>
+      <p:sp>
+        <p:nvSpPr>
+          <p:cNvPr id="2" name="Slide Image Placeholder 1"/>
+          <p:cNvSpPr>
+            <a:spLocks noGrp="1" noRot="1" noChangeAspect="1"/>
+          </p:cNvSpPr>
+          <p:nvPr>
+            <p:ph type="sldImg"/>
+          </p:nvPr>
+        </p:nvSpPr>
+        <p:spPr/>
+      </p:sp>
+      <p:sp>
+        <p:nvSpPr>
+          <p:cNvPr id="3" name="Notes Placeholder 2"/>
+          <p:cNvSpPr>
+            <a:spLocks noGrp="1"/>
+          </p:cNvSpPr>
+          <p:nvPr>
+            <p:ph type="body" idx="1"/>
+          </p:nvPr>
+        </p:nvSpPr>
+        <p:spPr/>
+        <p:txBody>
+          <a:bodyPr/>
+          <a:lstStyle/>
+          <a:p>
+            <a:r>
+              <a:rPr lang="en-US" dirty="0"/>
+              <a:t>Used icons from: https://aws.amazon.com/architecture/icons/</a:t>
+            </a:r>
+          </a:p>
+          <a:p>
+            <a:r>
+              <a:rPr lang="en-US" dirty="0"/>
+              <a:t>Website files use </a:t>
+            </a:r>
+            <a:r>
+              <a:rPr lang="en-US" dirty="0" err="1"/>
+              <a:t>Javascript</a:t>
+            </a:r>
+            <a:r>
+              <a:rPr lang="en-US" dirty="0"/>
+              <a:t> to access DynamoDB tables to build dynamic pages. Names.html also uses </a:t>
+            </a:r>
+            <a:r>
+              <a:rPr lang="en-US" dirty="0" err="1"/>
+              <a:t>Rekognition</a:t>
+            </a:r>
+            <a:r>
+              <a:rPr lang="en-US" dirty="0"/>
+              <a:t> </a:t>
+            </a:r>
+            <a:r>
+              <a:rPr lang="en-US" dirty="0" err="1"/>
+              <a:t>getCelebrityInfo</a:t>
+            </a:r>
+            <a:endParaRPr lang="en-US" dirty="0"/>
+          </a:p>
+        </p:txBody>
+      </p:sp>
+      <p:sp>
+        <p:nvSpPr>
+          <p:cNvPr id="4" name="Slide Number Placeholder 3"/>
+          <p:cNvSpPr>
+            <a:spLocks noGrp="1"/>
+          </p:cNvSpPr>
+          <p:nvPr>
+            <p:ph type="sldNum" sz="quarter" idx="10"/>
+          </p:nvPr>
+        </p:nvSpPr>
+        <p:spPr/>
+        <p:txBody>
+          <a:bodyPr/>
+          <a:lstStyle/>
+          <a:p>
+            <a:fld id="{A43A9EC1-7D08-4D00-B928-81A7176B4734}" type="slidenum">
+              <a:rPr lang="en-US" smtClean="0"/>
+              <a:t>4</a:t>
+            </a:fld>
+            <a:endParaRPr lang="en-US"/>
+          </a:p>
+        </p:txBody>
+      </p:sp>
+    </p:spTree>
+    <p:extLst>
+      <p:ext uri="{BB962C8B-B14F-4D97-AF65-F5344CB8AC3E}">
+        <p14:creationId xmlns:p14="http://schemas.microsoft.com/office/powerpoint/2010/main" val="465992047"/>
+      </p:ext>
+    </p:extLst>
+  </p:cSld>
+  <p:clrMapOvr>
+    <a:masterClrMapping/>
+  </p:clrMapOvr>
+</p:notes>
+</file>
+
+<file path=ppt/notesSlides/notesSlide4.xml><?xml version="1.0" encoding="utf-8"?>
+<p:notes xmlns:a="http://schemas.openxmlformats.org/drawingml/2006/main" xmlns:r="http://schemas.openxmlformats.org/officeDocument/2006/relationships" xmlns:p="http://schemas.openxmlformats.org/presentationml/2006/main">
+  <p:cSld>
+    <p:spTree>
+      <p:nvGrpSpPr>
+        <p:cNvPr id="1" name=""/>
+        <p:cNvGrpSpPr/>
+        <p:nvPr/>
+      </p:nvGrpSpPr>
+      <p:grpSpPr>
+        <a:xfrm>
+          <a:off x="0" y="0"/>
+          <a:ext cx="0" cy="0"/>
+          <a:chOff x="0" y="0"/>
+          <a:chExt cx="0" cy="0"/>
+        </a:xfrm>
+      </p:grpSpPr>
+      <p:sp>
+        <p:nvSpPr>
+          <p:cNvPr id="2" name="Slide Image Placeholder 1"/>
+          <p:cNvSpPr>
+            <a:spLocks noGrp="1" noRot="1" noChangeAspect="1"/>
+          </p:cNvSpPr>
+          <p:nvPr>
+            <p:ph type="sldImg"/>
+          </p:nvPr>
+        </p:nvSpPr>
+        <p:spPr/>
+      </p:sp>
+      <p:sp>
+        <p:nvSpPr>
+          <p:cNvPr id="3" name="Notes Placeholder 2"/>
+          <p:cNvSpPr>
+            <a:spLocks noGrp="1"/>
+          </p:cNvSpPr>
+          <p:nvPr>
+            <p:ph type="body" idx="1"/>
+          </p:nvPr>
+        </p:nvSpPr>
+        <p:spPr/>
+        <p:txBody>
+          <a:bodyPr/>
+          <a:lstStyle/>
+          <a:p>
+            <a:r>
+              <a:rPr lang="en-US" dirty="0"/>
+              <a:t>“Party of Five” from 1994 – 2000. Image approximately season 2 or 3.</a:t>
+            </a:r>
+          </a:p>
+        </p:txBody>
+      </p:sp>
+      <p:sp>
+        <p:nvSpPr>
+          <p:cNvPr id="4" name="Slide Number Placeholder 3"/>
+          <p:cNvSpPr>
+            <a:spLocks noGrp="1"/>
+          </p:cNvSpPr>
+          <p:nvPr>
+            <p:ph type="sldNum" sz="quarter" idx="10"/>
+          </p:nvPr>
+        </p:nvSpPr>
+        <p:spPr/>
+        <p:txBody>
+          <a:bodyPr/>
+          <a:lstStyle/>
+          <a:p>
+            <a:fld id="{A43A9EC1-7D08-4D00-B928-81A7176B4734}" type="slidenum">
+              <a:rPr lang="en-US" smtClean="0"/>
+              <a:t>5</a:t>
+            </a:fld>
+            <a:endParaRPr lang="en-US"/>
+          </a:p>
+        </p:txBody>
+      </p:sp>
+    </p:spTree>
+    <p:extLst>
+      <p:ext uri="{BB962C8B-B14F-4D97-AF65-F5344CB8AC3E}">
+        <p14:creationId xmlns:p14="http://schemas.microsoft.com/office/powerpoint/2010/main" val="2890563611"/>
+      </p:ext>
+    </p:extLst>
+  </p:cSld>
+  <p:clrMapOvr>
+    <a:masterClrMapping/>
+  </p:clrMapOvr>
+</p:notes>
+</file>
+
+<file path=ppt/notesSlides/notesSlide5.xml><?xml version="1.0" encoding="utf-8"?>
+<p:notes xmlns:a="http://schemas.openxmlformats.org/drawingml/2006/main" xmlns:r="http://schemas.openxmlformats.org/officeDocument/2006/relationships" xmlns:p="http://schemas.openxmlformats.org/presentationml/2006/main">
+  <p:cSld>
+    <p:spTree>
+      <p:nvGrpSpPr>
+        <p:cNvPr id="1" name=""/>
+        <p:cNvGrpSpPr/>
+        <p:nvPr/>
+      </p:nvGrpSpPr>
+      <p:grpSpPr>
+        <a:xfrm>
+          <a:off x="0" y="0"/>
+          <a:ext cx="0" cy="0"/>
+          <a:chOff x="0" y="0"/>
+          <a:chExt cx="0" cy="0"/>
+        </a:xfrm>
+      </p:grpSpPr>
+      <p:sp>
+        <p:nvSpPr>
+          <p:cNvPr id="2" name="Slide Image Placeholder 1"/>
+          <p:cNvSpPr>
+            <a:spLocks noGrp="1" noRot="1" noChangeAspect="1"/>
+          </p:cNvSpPr>
+          <p:nvPr>
+            <p:ph type="sldImg"/>
+          </p:nvPr>
+        </p:nvSpPr>
+        <p:spPr/>
+      </p:sp>
+      <p:sp>
+        <p:nvSpPr>
+          <p:cNvPr id="3" name="Notes Placeholder 2"/>
+          <p:cNvSpPr>
+            <a:spLocks noGrp="1"/>
+          </p:cNvSpPr>
+          <p:nvPr>
+            <p:ph type="body" idx="1"/>
+          </p:nvPr>
+        </p:nvSpPr>
+        <p:spPr/>
+        <p:txBody>
+          <a:bodyPr/>
+          <a:lstStyle/>
+          <a:p>
+            <a:r>
+              <a:rPr lang="en-US" dirty="0"/>
+              <a:t>Azure facial analysis results seem to be better (includes hair)</a:t>
+            </a:r>
+          </a:p>
+          <a:p>
+            <a:r>
+              <a:rPr lang="en-US" dirty="0"/>
+              <a:t>Google results a bit disorganized but did provide URLs of similar images</a:t>
+            </a:r>
+          </a:p>
+        </p:txBody>
+      </p:sp>
+      <p:sp>
+        <p:nvSpPr>
+          <p:cNvPr id="4" name="Slide Number Placeholder 3"/>
+          <p:cNvSpPr>
+            <a:spLocks noGrp="1"/>
+          </p:cNvSpPr>
+          <p:nvPr>
+            <p:ph type="sldNum" sz="quarter" idx="10"/>
+          </p:nvPr>
+        </p:nvSpPr>
+        <p:spPr/>
+        <p:txBody>
+          <a:bodyPr/>
+          <a:lstStyle/>
+          <a:p>
+            <a:fld id="{A43A9EC1-7D08-4D00-B928-81A7176B4734}" type="slidenum">
+              <a:rPr lang="en-US" smtClean="0"/>
+              <a:t>7</a:t>
+            </a:fld>
+            <a:endParaRPr lang="en-US"/>
+          </a:p>
+        </p:txBody>
+      </p:sp>
+    </p:spTree>
+    <p:extLst>
+      <p:ext uri="{BB962C8B-B14F-4D97-AF65-F5344CB8AC3E}">
+        <p14:creationId xmlns:p14="http://schemas.microsoft.com/office/powerpoint/2010/main" val="3366545782"/>
+      </p:ext>
+    </p:extLst>
+  </p:cSld>
+  <p:clrMapOvr>
+    <a:masterClrMapping/>
+  </p:clrMapOvr>
+</p:notes>
+</file>
+
 <file path=ppt/slideLayouts/slideLayout1.xml><?xml version="1.0" encoding="utf-8"?>
 <p:sldLayout xmlns:a="http://schemas.openxmlformats.org/drawingml/2006/main" xmlns:r="http://schemas.openxmlformats.org/officeDocument/2006/relationships" xmlns:p="http://schemas.openxmlformats.org/presentationml/2006/main" showMasterSp="0" type="title" preserve="1">
   <p:cSld name="Title Slide">
@@ -171,7 +993,7 @@
           <a:noFill/>
           <a:extLst>
             <a:ext uri="{909E8E84-426E-40dd-AFC4-6F175D3DCCD1}">
-              <a14:hiddenFill xmlns="" xmlns:a14="http://schemas.microsoft.com/office/drawing/2010/main">
+              <a14:hiddenFill xmlns:a14="http://schemas.microsoft.com/office/drawing/2010/main" xmlns="">
                 <a:solidFill>
                   <a:srgbClr val="FFFFFF"/>
                 </a:solidFill>
@@ -231,7 +1053,7 @@
             </a:ln>
             <a:extLst>
               <a:ext uri="{91240B29-F687-4f45-9708-019B960494DF}">
-                <a14:hiddenLine xmlns="" xmlns:a14="http://schemas.microsoft.com/office/drawing/2010/main" w="9525">
+                <a14:hiddenLine xmlns:a14="http://schemas.microsoft.com/office/drawing/2010/main" xmlns="" w="9525">
                   <a:solidFill>
                     <a:srgbClr val="000000"/>
                   </a:solidFill>
@@ -321,7 +1143,7 @@
             </a:ln>
             <a:extLst>
               <a:ext uri="{91240B29-F687-4f45-9708-019B960494DF}">
-                <a14:hiddenLine xmlns="" xmlns:a14="http://schemas.microsoft.com/office/drawing/2010/main" w="9525">
+                <a14:hiddenLine xmlns:a14="http://schemas.microsoft.com/office/drawing/2010/main" xmlns="" w="9525">
                   <a:solidFill>
                     <a:srgbClr val="000000"/>
                   </a:solidFill>
@@ -411,7 +1233,7 @@
             </a:ln>
             <a:extLst>
               <a:ext uri="{91240B29-F687-4f45-9708-019B960494DF}">
-                <a14:hiddenLine xmlns="" xmlns:a14="http://schemas.microsoft.com/office/drawing/2010/main" w="9525">
+                <a14:hiddenLine xmlns:a14="http://schemas.microsoft.com/office/drawing/2010/main" xmlns="" w="9525">
                   <a:solidFill>
                     <a:srgbClr val="000000"/>
                   </a:solidFill>
@@ -445,7 +1267,7 @@
             </a:ln>
             <a:extLst>
               <a:ext uri="{91240B29-F687-4f45-9708-019B960494DF}">
-                <a14:hiddenLine xmlns="" xmlns:a14="http://schemas.microsoft.com/office/drawing/2010/main" w="9525">
+                <a14:hiddenLine xmlns:a14="http://schemas.microsoft.com/office/drawing/2010/main" xmlns="" w="9525">
                   <a:solidFill>
                     <a:srgbClr val="000000"/>
                   </a:solidFill>
@@ -535,7 +1357,7 @@
             </a:ln>
             <a:extLst>
               <a:ext uri="{91240B29-F687-4f45-9708-019B960494DF}">
-                <a14:hiddenLine xmlns="" xmlns:a14="http://schemas.microsoft.com/office/drawing/2010/main" w="9525">
+                <a14:hiddenLine xmlns:a14="http://schemas.microsoft.com/office/drawing/2010/main" xmlns="" w="9525">
                   <a:solidFill>
                     <a:srgbClr val="000000"/>
                   </a:solidFill>
@@ -597,7 +1419,7 @@
             </a:ln>
             <a:extLst>
               <a:ext uri="{91240B29-F687-4f45-9708-019B960494DF}">
-                <a14:hiddenLine xmlns="" xmlns:a14="http://schemas.microsoft.com/office/drawing/2010/main" w="9525">
+                <a14:hiddenLine xmlns:a14="http://schemas.microsoft.com/office/drawing/2010/main" xmlns="" w="9525">
                   <a:solidFill>
                     <a:srgbClr val="000000"/>
                   </a:solidFill>
@@ -659,7 +1481,7 @@
             </a:ln>
             <a:extLst>
               <a:ext uri="{91240B29-F687-4f45-9708-019B960494DF}">
-                <a14:hiddenLine xmlns="" xmlns:a14="http://schemas.microsoft.com/office/drawing/2010/main" w="9525">
+                <a14:hiddenLine xmlns:a14="http://schemas.microsoft.com/office/drawing/2010/main" xmlns="" w="9525">
                   <a:solidFill>
                     <a:srgbClr val="000000"/>
                   </a:solidFill>
@@ -749,7 +1571,7 @@
             </a:ln>
             <a:extLst>
               <a:ext uri="{91240B29-F687-4f45-9708-019B960494DF}">
-                <a14:hiddenLine xmlns="" xmlns:a14="http://schemas.microsoft.com/office/drawing/2010/main" w="9525">
+                <a14:hiddenLine xmlns:a14="http://schemas.microsoft.com/office/drawing/2010/main" xmlns="" w="9525">
                   <a:solidFill>
                     <a:srgbClr val="000000"/>
                   </a:solidFill>
@@ -811,7 +1633,7 @@
             </a:ln>
             <a:extLst>
               <a:ext uri="{91240B29-F687-4f45-9708-019B960494DF}">
-                <a14:hiddenLine xmlns="" xmlns:a14="http://schemas.microsoft.com/office/drawing/2010/main" w="9525">
+                <a14:hiddenLine xmlns:a14="http://schemas.microsoft.com/office/drawing/2010/main" xmlns="" w="9525">
                   <a:solidFill>
                     <a:srgbClr val="000000"/>
                   </a:solidFill>
@@ -873,7 +1695,7 @@
             </a:ln>
             <a:extLst>
               <a:ext uri="{91240B29-F687-4f45-9708-019B960494DF}">
-                <a14:hiddenLine xmlns="" xmlns:a14="http://schemas.microsoft.com/office/drawing/2010/main" w="9525">
+                <a14:hiddenLine xmlns:a14="http://schemas.microsoft.com/office/drawing/2010/main" xmlns="" w="9525">
                   <a:solidFill>
                     <a:srgbClr val="000000"/>
                   </a:solidFill>
@@ -963,7 +1785,7 @@
             </a:ln>
             <a:extLst>
               <a:ext uri="{91240B29-F687-4f45-9708-019B960494DF}">
-                <a14:hiddenLine xmlns="" xmlns:a14="http://schemas.microsoft.com/office/drawing/2010/main" w="9525">
+                <a14:hiddenLine xmlns:a14="http://schemas.microsoft.com/office/drawing/2010/main" xmlns="" w="9525">
                   <a:solidFill>
                     <a:srgbClr val="000000"/>
                   </a:solidFill>
@@ -1053,7 +1875,7 @@
             </a:ln>
             <a:extLst>
               <a:ext uri="{91240B29-F687-4f45-9708-019B960494DF}">
-                <a14:hiddenLine xmlns="" xmlns:a14="http://schemas.microsoft.com/office/drawing/2010/main" w="9525">
+                <a14:hiddenLine xmlns:a14="http://schemas.microsoft.com/office/drawing/2010/main" xmlns="" w="9525">
                   <a:solidFill>
                     <a:srgbClr val="000000"/>
                   </a:solidFill>
@@ -1115,7 +1937,7 @@
             </a:ln>
             <a:extLst>
               <a:ext uri="{91240B29-F687-4f45-9708-019B960494DF}">
-                <a14:hiddenLine xmlns="" xmlns:a14="http://schemas.microsoft.com/office/drawing/2010/main" w="9525">
+                <a14:hiddenLine xmlns:a14="http://schemas.microsoft.com/office/drawing/2010/main" xmlns="" w="9525">
                   <a:solidFill>
                     <a:srgbClr val="000000"/>
                   </a:solidFill>
@@ -1225,7 +2047,7 @@
             </a:ln>
             <a:extLst>
               <a:ext uri="{91240B29-F687-4f45-9708-019B960494DF}">
-                <a14:hiddenLine xmlns="" xmlns:a14="http://schemas.microsoft.com/office/drawing/2010/main" w="9525">
+                <a14:hiddenLine xmlns:a14="http://schemas.microsoft.com/office/drawing/2010/main" xmlns="" w="9525">
                   <a:solidFill>
                     <a:srgbClr val="000000"/>
                   </a:solidFill>
@@ -1287,7 +2109,7 @@
             </a:ln>
             <a:extLst>
               <a:ext uri="{91240B29-F687-4f45-9708-019B960494DF}">
-                <a14:hiddenLine xmlns="" xmlns:a14="http://schemas.microsoft.com/office/drawing/2010/main" w="9525">
+                <a14:hiddenLine xmlns:a14="http://schemas.microsoft.com/office/drawing/2010/main" xmlns="" w="9525">
                   <a:solidFill>
                     <a:srgbClr val="000000"/>
                   </a:solidFill>
@@ -1377,7 +2199,7 @@
             </a:ln>
             <a:extLst>
               <a:ext uri="{91240B29-F687-4f45-9708-019B960494DF}">
-                <a14:hiddenLine xmlns="" xmlns:a14="http://schemas.microsoft.com/office/drawing/2010/main" w="9525">
+                <a14:hiddenLine xmlns:a14="http://schemas.microsoft.com/office/drawing/2010/main" xmlns="" w="9525">
                   <a:solidFill>
                     <a:srgbClr val="000000"/>
                   </a:solidFill>
@@ -1467,7 +2289,7 @@
             </a:ln>
             <a:extLst>
               <a:ext uri="{91240B29-F687-4f45-9708-019B960494DF}">
-                <a14:hiddenLine xmlns="" xmlns:a14="http://schemas.microsoft.com/office/drawing/2010/main" w="9525">
+                <a14:hiddenLine xmlns:a14="http://schemas.microsoft.com/office/drawing/2010/main" xmlns="" w="9525">
                   <a:solidFill>
                     <a:srgbClr val="000000"/>
                   </a:solidFill>
@@ -1529,7 +2351,7 @@
             </a:ln>
             <a:extLst>
               <a:ext uri="{91240B29-F687-4f45-9708-019B960494DF}">
-                <a14:hiddenLine xmlns="" xmlns:a14="http://schemas.microsoft.com/office/drawing/2010/main" w="9525">
+                <a14:hiddenLine xmlns:a14="http://schemas.microsoft.com/office/drawing/2010/main" xmlns="" w="9525">
                   <a:solidFill>
                     <a:srgbClr val="000000"/>
                   </a:solidFill>
@@ -1619,7 +2441,7 @@
             </a:ln>
             <a:extLst>
               <a:ext uri="{91240B29-F687-4f45-9708-019B960494DF}">
-                <a14:hiddenLine xmlns="" xmlns:a14="http://schemas.microsoft.com/office/drawing/2010/main" w="9525">
+                <a14:hiddenLine xmlns:a14="http://schemas.microsoft.com/office/drawing/2010/main" xmlns="" w="9525">
                   <a:solidFill>
                     <a:srgbClr val="000000"/>
                   </a:solidFill>
@@ -1709,7 +2531,7 @@
             </a:ln>
             <a:extLst>
               <a:ext uri="{91240B29-F687-4f45-9708-019B960494DF}">
-                <a14:hiddenLine xmlns="" xmlns:a14="http://schemas.microsoft.com/office/drawing/2010/main" w="9525">
+                <a14:hiddenLine xmlns:a14="http://schemas.microsoft.com/office/drawing/2010/main" xmlns="" w="9525">
                   <a:solidFill>
                     <a:srgbClr val="000000"/>
                   </a:solidFill>
@@ -1765,7 +2587,7 @@
             </a:ln>
             <a:extLst>
               <a:ext uri="{91240B29-F687-4f45-9708-019B960494DF}">
-                <a14:hiddenLine xmlns="" xmlns:a14="http://schemas.microsoft.com/office/drawing/2010/main" w="9525">
+                <a14:hiddenLine xmlns:a14="http://schemas.microsoft.com/office/drawing/2010/main" xmlns="" w="9525">
                   <a:solidFill>
                     <a:srgbClr val="000000"/>
                   </a:solidFill>
@@ -1855,7 +2677,7 @@
             </a:ln>
             <a:extLst>
               <a:ext uri="{91240B29-F687-4f45-9708-019B960494DF}">
-                <a14:hiddenLine xmlns="" xmlns:a14="http://schemas.microsoft.com/office/drawing/2010/main" w="9525">
+                <a14:hiddenLine xmlns:a14="http://schemas.microsoft.com/office/drawing/2010/main" xmlns="" w="9525">
                   <a:solidFill>
                     <a:srgbClr val="000000"/>
                   </a:solidFill>
@@ -1911,7 +2733,7 @@
             </a:ln>
             <a:extLst>
               <a:ext uri="{91240B29-F687-4f45-9708-019B960494DF}">
-                <a14:hiddenLine xmlns="" xmlns:a14="http://schemas.microsoft.com/office/drawing/2010/main" w="9525">
+                <a14:hiddenLine xmlns:a14="http://schemas.microsoft.com/office/drawing/2010/main" xmlns="" w="9525">
                   <a:solidFill>
                     <a:srgbClr val="000000"/>
                   </a:solidFill>
@@ -2001,7 +2823,7 @@
             </a:ln>
             <a:extLst>
               <a:ext uri="{91240B29-F687-4f45-9708-019B960494DF}">
-                <a14:hiddenLine xmlns="" xmlns:a14="http://schemas.microsoft.com/office/drawing/2010/main" w="9525">
+                <a14:hiddenLine xmlns:a14="http://schemas.microsoft.com/office/drawing/2010/main" xmlns="" w="9525">
                   <a:solidFill>
                     <a:srgbClr val="000000"/>
                   </a:solidFill>
@@ -2069,7 +2891,7 @@
             </a:ln>
             <a:extLst>
               <a:ext uri="{91240B29-F687-4f45-9708-019B960494DF}">
-                <a14:hiddenLine xmlns="" xmlns:a14="http://schemas.microsoft.com/office/drawing/2010/main" w="9525">
+                <a14:hiddenLine xmlns:a14="http://schemas.microsoft.com/office/drawing/2010/main" xmlns="" w="9525">
                   <a:solidFill>
                     <a:srgbClr val="000000"/>
                   </a:solidFill>
@@ -2159,7 +2981,7 @@
             </a:ln>
             <a:extLst>
               <a:ext uri="{91240B29-F687-4f45-9708-019B960494DF}">
-                <a14:hiddenLine xmlns="" xmlns:a14="http://schemas.microsoft.com/office/drawing/2010/main" w="9525">
+                <a14:hiddenLine xmlns:a14="http://schemas.microsoft.com/office/drawing/2010/main" xmlns="" w="9525">
                   <a:solidFill>
                     <a:srgbClr val="000000"/>
                   </a:solidFill>
@@ -2227,7 +3049,7 @@
             </a:ln>
             <a:extLst>
               <a:ext uri="{91240B29-F687-4f45-9708-019B960494DF}">
-                <a14:hiddenLine xmlns="" xmlns:a14="http://schemas.microsoft.com/office/drawing/2010/main" w="9525">
+                <a14:hiddenLine xmlns:a14="http://schemas.microsoft.com/office/drawing/2010/main" xmlns="" w="9525">
                   <a:solidFill>
                     <a:srgbClr val="000000"/>
                   </a:solidFill>
@@ -2317,7 +3139,7 @@
             </a:ln>
             <a:extLst>
               <a:ext uri="{91240B29-F687-4f45-9708-019B960494DF}">
-                <a14:hiddenLine xmlns="" xmlns:a14="http://schemas.microsoft.com/office/drawing/2010/main" w="9525">
+                <a14:hiddenLine xmlns:a14="http://schemas.microsoft.com/office/drawing/2010/main" xmlns="" w="9525">
                   <a:solidFill>
                     <a:srgbClr val="000000"/>
                   </a:solidFill>
@@ -2351,7 +3173,7 @@
             </a:ln>
             <a:extLst>
               <a:ext uri="{91240B29-F687-4f45-9708-019B960494DF}">
-                <a14:hiddenLine xmlns="" xmlns:a14="http://schemas.microsoft.com/office/drawing/2010/main" w="9525">
+                <a14:hiddenLine xmlns:a14="http://schemas.microsoft.com/office/drawing/2010/main" xmlns="" w="9525">
                   <a:solidFill>
                     <a:srgbClr val="000000"/>
                   </a:solidFill>
@@ -2441,7 +3263,7 @@
             </a:ln>
             <a:extLst>
               <a:ext uri="{91240B29-F687-4f45-9708-019B960494DF}">
-                <a14:hiddenLine xmlns="" xmlns:a14="http://schemas.microsoft.com/office/drawing/2010/main" w="9525">
+                <a14:hiddenLine xmlns:a14="http://schemas.microsoft.com/office/drawing/2010/main" xmlns="" w="9525">
                   <a:solidFill>
                     <a:srgbClr val="000000"/>
                   </a:solidFill>
@@ -2503,7 +3325,7 @@
             </a:ln>
             <a:extLst>
               <a:ext uri="{91240B29-F687-4f45-9708-019B960494DF}">
-                <a14:hiddenLine xmlns="" xmlns:a14="http://schemas.microsoft.com/office/drawing/2010/main" w="9525">
+                <a14:hiddenLine xmlns:a14="http://schemas.microsoft.com/office/drawing/2010/main" xmlns="" w="9525">
                   <a:solidFill>
                     <a:srgbClr val="000000"/>
                   </a:solidFill>
@@ -2565,7 +3387,7 @@
             </a:ln>
             <a:extLst>
               <a:ext uri="{91240B29-F687-4f45-9708-019B960494DF}">
-                <a14:hiddenLine xmlns="" xmlns:a14="http://schemas.microsoft.com/office/drawing/2010/main" w="9525">
+                <a14:hiddenLine xmlns:a14="http://schemas.microsoft.com/office/drawing/2010/main" xmlns="" w="9525">
                   <a:solidFill>
                     <a:srgbClr val="000000"/>
                   </a:solidFill>
@@ -2655,7 +3477,7 @@
             </a:ln>
             <a:extLst>
               <a:ext uri="{91240B29-F687-4f45-9708-019B960494DF}">
-                <a14:hiddenLine xmlns="" xmlns:a14="http://schemas.microsoft.com/office/drawing/2010/main" w="9525">
+                <a14:hiddenLine xmlns:a14="http://schemas.microsoft.com/office/drawing/2010/main" xmlns="" w="9525">
                   <a:solidFill>
                     <a:srgbClr val="000000"/>
                   </a:solidFill>
@@ -2723,7 +3545,7 @@
             </a:ln>
             <a:extLst>
               <a:ext uri="{91240B29-F687-4f45-9708-019B960494DF}">
-                <a14:hiddenLine xmlns="" xmlns:a14="http://schemas.microsoft.com/office/drawing/2010/main" w="9525">
+                <a14:hiddenLine xmlns:a14="http://schemas.microsoft.com/office/drawing/2010/main" xmlns="" w="9525">
                   <a:solidFill>
                     <a:srgbClr val="000000"/>
                   </a:solidFill>
@@ -2785,7 +3607,7 @@
             </a:ln>
             <a:extLst>
               <a:ext uri="{91240B29-F687-4f45-9708-019B960494DF}">
-                <a14:hiddenLine xmlns="" xmlns:a14="http://schemas.microsoft.com/office/drawing/2010/main" w="9525">
+                <a14:hiddenLine xmlns:a14="http://schemas.microsoft.com/office/drawing/2010/main" xmlns="" w="9525">
                   <a:solidFill>
                     <a:srgbClr val="000000"/>
                   </a:solidFill>
@@ -2875,7 +3697,7 @@
             </a:ln>
             <a:extLst>
               <a:ext uri="{91240B29-F687-4f45-9708-019B960494DF}">
-                <a14:hiddenLine xmlns="" xmlns:a14="http://schemas.microsoft.com/office/drawing/2010/main" w="9525">
+                <a14:hiddenLine xmlns:a14="http://schemas.microsoft.com/office/drawing/2010/main" xmlns="" w="9525">
                   <a:solidFill>
                     <a:srgbClr val="000000"/>
                   </a:solidFill>
@@ -2937,7 +3759,7 @@
             </a:ln>
             <a:extLst>
               <a:ext uri="{91240B29-F687-4f45-9708-019B960494DF}">
-                <a14:hiddenLine xmlns="" xmlns:a14="http://schemas.microsoft.com/office/drawing/2010/main" w="9525">
+                <a14:hiddenLine xmlns:a14="http://schemas.microsoft.com/office/drawing/2010/main" xmlns="" w="9525">
                   <a:solidFill>
                     <a:srgbClr val="000000"/>
                   </a:solidFill>
@@ -3027,7 +3849,7 @@
             </a:ln>
             <a:extLst>
               <a:ext uri="{91240B29-F687-4f45-9708-019B960494DF}">
-                <a14:hiddenLine xmlns="" xmlns:a14="http://schemas.microsoft.com/office/drawing/2010/main" w="9525">
+                <a14:hiddenLine xmlns:a14="http://schemas.microsoft.com/office/drawing/2010/main" xmlns="" w="9525">
                   <a:solidFill>
                     <a:srgbClr val="000000"/>
                   </a:solidFill>
@@ -3089,7 +3911,7 @@
             </a:ln>
             <a:extLst>
               <a:ext uri="{91240B29-F687-4f45-9708-019B960494DF}">
-                <a14:hiddenLine xmlns="" xmlns:a14="http://schemas.microsoft.com/office/drawing/2010/main" w="9525">
+                <a14:hiddenLine xmlns:a14="http://schemas.microsoft.com/office/drawing/2010/main" xmlns="" w="9525">
                   <a:solidFill>
                     <a:srgbClr val="000000"/>
                   </a:solidFill>
@@ -3179,7 +4001,7 @@
             </a:ln>
             <a:extLst>
               <a:ext uri="{91240B29-F687-4f45-9708-019B960494DF}">
-                <a14:hiddenLine xmlns="" xmlns:a14="http://schemas.microsoft.com/office/drawing/2010/main" w="9525">
+                <a14:hiddenLine xmlns:a14="http://schemas.microsoft.com/office/drawing/2010/main" xmlns="" w="9525">
                   <a:solidFill>
                     <a:srgbClr val="000000"/>
                   </a:solidFill>
@@ -3213,7 +4035,7 @@
             </a:ln>
             <a:extLst>
               <a:ext uri="{91240B29-F687-4f45-9708-019B960494DF}">
-                <a14:hiddenLine xmlns="" xmlns:a14="http://schemas.microsoft.com/office/drawing/2010/main" w="9525">
+                <a14:hiddenLine xmlns:a14="http://schemas.microsoft.com/office/drawing/2010/main" xmlns="" w="9525">
                   <a:solidFill>
                     <a:srgbClr val="000000"/>
                   </a:solidFill>
@@ -3278,7 +4100,7 @@
             </a:ln>
             <a:extLst>
               <a:ext uri="{91240B29-F687-4f45-9708-019B960494DF}">
-                <a14:hiddenLine xmlns="" xmlns:a14="http://schemas.microsoft.com/office/drawing/2010/main" w="9525">
+                <a14:hiddenLine xmlns:a14="http://schemas.microsoft.com/office/drawing/2010/main" xmlns="" w="9525">
                   <a:solidFill>
                     <a:srgbClr val="000000"/>
                   </a:solidFill>
@@ -3368,7 +4190,7 @@
             </a:ln>
             <a:extLst>
               <a:ext uri="{91240B29-F687-4f45-9708-019B960494DF}">
-                <a14:hiddenLine xmlns="" xmlns:a14="http://schemas.microsoft.com/office/drawing/2010/main" w="9525">
+                <a14:hiddenLine xmlns:a14="http://schemas.microsoft.com/office/drawing/2010/main" xmlns="" w="9525">
                   <a:solidFill>
                     <a:srgbClr val="000000"/>
                   </a:solidFill>
@@ -3430,7 +4252,7 @@
             </a:ln>
             <a:extLst>
               <a:ext uri="{91240B29-F687-4f45-9708-019B960494DF}">
-                <a14:hiddenLine xmlns="" xmlns:a14="http://schemas.microsoft.com/office/drawing/2010/main" w="9525">
+                <a14:hiddenLine xmlns:a14="http://schemas.microsoft.com/office/drawing/2010/main" xmlns="" w="9525">
                   <a:solidFill>
                     <a:srgbClr val="000000"/>
                   </a:solidFill>
@@ -3520,7 +4342,7 @@
             </a:ln>
             <a:extLst>
               <a:ext uri="{91240B29-F687-4f45-9708-019B960494DF}">
-                <a14:hiddenLine xmlns="" xmlns:a14="http://schemas.microsoft.com/office/drawing/2010/main" w="9525">
+                <a14:hiddenLine xmlns:a14="http://schemas.microsoft.com/office/drawing/2010/main" xmlns="" w="9525">
                   <a:solidFill>
                     <a:srgbClr val="000000"/>
                   </a:solidFill>
@@ -3610,7 +4432,7 @@
             </a:ln>
             <a:extLst>
               <a:ext uri="{91240B29-F687-4f45-9708-019B960494DF}">
-                <a14:hiddenLine xmlns="" xmlns:a14="http://schemas.microsoft.com/office/drawing/2010/main" w="9525">
+                <a14:hiddenLine xmlns:a14="http://schemas.microsoft.com/office/drawing/2010/main" xmlns="" w="9525">
                   <a:solidFill>
                     <a:srgbClr val="000000"/>
                   </a:solidFill>
@@ -3675,7 +4497,7 @@
             </a:ln>
             <a:extLst>
               <a:ext uri="{91240B29-F687-4f45-9708-019B960494DF}">
-                <a14:hiddenLine xmlns="" xmlns:a14="http://schemas.microsoft.com/office/drawing/2010/main" w="9525">
+                <a14:hiddenLine xmlns:a14="http://schemas.microsoft.com/office/drawing/2010/main" xmlns="" w="9525">
                   <a:solidFill>
                     <a:srgbClr val="000000"/>
                   </a:solidFill>
@@ -3737,7 +4559,7 @@
             </a:ln>
             <a:extLst>
               <a:ext uri="{91240B29-F687-4f45-9708-019B960494DF}">
-                <a14:hiddenLine xmlns="" xmlns:a14="http://schemas.microsoft.com/office/drawing/2010/main" w="9525">
+                <a14:hiddenLine xmlns:a14="http://schemas.microsoft.com/office/drawing/2010/main" xmlns="" w="9525">
                   <a:solidFill>
                     <a:srgbClr val="000000"/>
                   </a:solidFill>
@@ -3827,7 +4649,7 @@
             </a:ln>
             <a:extLst>
               <a:ext uri="{91240B29-F687-4f45-9708-019B960494DF}">
-                <a14:hiddenLine xmlns="" xmlns:a14="http://schemas.microsoft.com/office/drawing/2010/main" w="9525">
+                <a14:hiddenLine xmlns:a14="http://schemas.microsoft.com/office/drawing/2010/main" xmlns="" w="9525">
                   <a:solidFill>
                     <a:srgbClr val="000000"/>
                   </a:solidFill>
@@ -3917,7 +4739,7 @@
             </a:ln>
             <a:extLst>
               <a:ext uri="{91240B29-F687-4f45-9708-019B960494DF}">
-                <a14:hiddenLine xmlns="" xmlns:a14="http://schemas.microsoft.com/office/drawing/2010/main" w="9525">
+                <a14:hiddenLine xmlns:a14="http://schemas.microsoft.com/office/drawing/2010/main" xmlns="" w="9525">
                   <a:solidFill>
                     <a:srgbClr val="000000"/>
                   </a:solidFill>
@@ -3979,7 +4801,7 @@
             </a:ln>
             <a:extLst>
               <a:ext uri="{91240B29-F687-4f45-9708-019B960494DF}">
-                <a14:hiddenLine xmlns="" xmlns:a14="http://schemas.microsoft.com/office/drawing/2010/main" w="9525">
+                <a14:hiddenLine xmlns:a14="http://schemas.microsoft.com/office/drawing/2010/main" xmlns="" w="9525">
                   <a:solidFill>
                     <a:srgbClr val="000000"/>
                   </a:solidFill>
@@ -4099,7 +4921,7 @@
             </a:ln>
             <a:extLst>
               <a:ext uri="{91240B29-F687-4f45-9708-019B960494DF}">
-                <a14:hiddenLine xmlns="" xmlns:a14="http://schemas.microsoft.com/office/drawing/2010/main" w="9525">
+                <a14:hiddenLine xmlns:a14="http://schemas.microsoft.com/office/drawing/2010/main" xmlns="" w="9525">
                   <a:solidFill>
                     <a:srgbClr val="000000"/>
                   </a:solidFill>
@@ -4167,7 +4989,7 @@
             </a:ln>
             <a:extLst>
               <a:ext uri="{91240B29-F687-4f45-9708-019B960494DF}">
-                <a14:hiddenLine xmlns="" xmlns:a14="http://schemas.microsoft.com/office/drawing/2010/main" w="9525">
+                <a14:hiddenLine xmlns:a14="http://schemas.microsoft.com/office/drawing/2010/main" xmlns="" w="9525">
                   <a:solidFill>
                     <a:srgbClr val="000000"/>
                   </a:solidFill>
@@ -4257,7 +5079,7 @@
             </a:ln>
             <a:extLst>
               <a:ext uri="{91240B29-F687-4f45-9708-019B960494DF}">
-                <a14:hiddenLine xmlns="" xmlns:a14="http://schemas.microsoft.com/office/drawing/2010/main" w="9525">
+                <a14:hiddenLine xmlns:a14="http://schemas.microsoft.com/office/drawing/2010/main" xmlns="" w="9525">
                   <a:solidFill>
                     <a:srgbClr val="000000"/>
                   </a:solidFill>
@@ -4397,7 +5219,7 @@
           <a:p>
             <a:fld id="{48A87A34-81AB-432B-8DAE-1953F412C126}" type="datetimeFigureOut">
               <a:rPr lang="en-US" dirty="0"/>
-              <a:t>6/18/2017</a:t>
+              <a:t>6/19/2017</a:t>
             </a:fld>
             <a:endParaRPr lang="en-US" dirty="0"/>
           </a:p>
@@ -4659,7 +5481,7 @@
           <a:p>
             <a:fld id="{48A87A34-81AB-432B-8DAE-1953F412C126}" type="datetimeFigureOut">
               <a:rPr lang="en-US" dirty="0"/>
-              <a:t>6/18/2017</a:t>
+              <a:t>6/19/2017</a:t>
             </a:fld>
             <a:endParaRPr lang="en-US" dirty="0"/>
           </a:p>
@@ -4850,7 +5672,7 @@
           <a:p>
             <a:fld id="{48A87A34-81AB-432B-8DAE-1953F412C126}" type="datetimeFigureOut">
               <a:rPr lang="en-US" dirty="0"/>
-              <a:t>6/18/2017</a:t>
+              <a:t>6/19/2017</a:t>
             </a:fld>
             <a:endParaRPr lang="en-US" dirty="0"/>
           </a:p>
@@ -5108,7 +5930,7 @@
           <a:p>
             <a:fld id="{48A87A34-81AB-432B-8DAE-1953F412C126}" type="datetimeFigureOut">
               <a:rPr lang="en-US" dirty="0"/>
-              <a:t>6/18/2017</a:t>
+              <a:t>6/19/2017</a:t>
             </a:fld>
             <a:endParaRPr lang="en-US" dirty="0"/>
           </a:p>
@@ -5537,7 +6359,7 @@
           <a:p>
             <a:fld id="{48A87A34-81AB-432B-8DAE-1953F412C126}" type="datetimeFigureOut">
               <a:rPr lang="en-US" dirty="0"/>
-              <a:t>6/18/2017</a:t>
+              <a:t>6/19/2017</a:t>
             </a:fld>
             <a:endParaRPr lang="en-US" dirty="0"/>
           </a:p>
@@ -6078,7 +6900,7 @@
           <a:p>
             <a:fld id="{48A87A34-81AB-432B-8DAE-1953F412C126}" type="datetimeFigureOut">
               <a:rPr lang="en-US" dirty="0"/>
-              <a:t>6/18/2017</a:t>
+              <a:t>6/19/2017</a:t>
             </a:fld>
             <a:endParaRPr lang="en-US" dirty="0"/>
           </a:p>
@@ -6793,7 +7615,7 @@
           <a:p>
             <a:fld id="{48A87A34-81AB-432B-8DAE-1953F412C126}" type="datetimeFigureOut">
               <a:rPr lang="en-US" dirty="0"/>
-              <a:t>6/18/2017</a:t>
+              <a:t>6/19/2017</a:t>
             </a:fld>
             <a:endParaRPr lang="en-US" dirty="0"/>
           </a:p>
@@ -6958,7 +7780,7 @@
           <a:p>
             <a:fld id="{48A87A34-81AB-432B-8DAE-1953F412C126}" type="datetimeFigureOut">
               <a:rPr lang="en-US" dirty="0"/>
-              <a:t>6/18/2017</a:t>
+              <a:t>6/19/2017</a:t>
             </a:fld>
             <a:endParaRPr lang="en-US" dirty="0"/>
           </a:p>
@@ -7133,7 +7955,7 @@
           <a:p>
             <a:fld id="{48A87A34-81AB-432B-8DAE-1953F412C126}" type="datetimeFigureOut">
               <a:rPr lang="en-US" dirty="0"/>
-              <a:t>6/18/2017</a:t>
+              <a:t>6/19/2017</a:t>
             </a:fld>
             <a:endParaRPr lang="en-US" dirty="0"/>
           </a:p>
@@ -7298,7 +8120,7 @@
           <a:p>
             <a:fld id="{48A87A34-81AB-432B-8DAE-1953F412C126}" type="datetimeFigureOut">
               <a:rPr lang="en-US" dirty="0"/>
-              <a:t>6/18/2017</a:t>
+              <a:t>6/19/2017</a:t>
             </a:fld>
             <a:endParaRPr lang="en-US" dirty="0"/>
           </a:p>
@@ -7543,7 +8365,7 @@
           <a:p>
             <a:fld id="{48A87A34-81AB-432B-8DAE-1953F412C126}" type="datetimeFigureOut">
               <a:rPr lang="en-US" dirty="0"/>
-              <a:t>6/18/2017</a:t>
+              <a:t>6/19/2017</a:t>
             </a:fld>
             <a:endParaRPr lang="en-US" dirty="0"/>
           </a:p>
@@ -7770,7 +8592,7 @@
           <a:p>
             <a:fld id="{48A87A34-81AB-432B-8DAE-1953F412C126}" type="datetimeFigureOut">
               <a:rPr lang="en-US" dirty="0"/>
-              <a:t>6/18/2017</a:t>
+              <a:t>6/19/2017</a:t>
             </a:fld>
             <a:endParaRPr lang="en-US" dirty="0"/>
           </a:p>
@@ -8146,7 +8968,7 @@
           <a:p>
             <a:fld id="{48A87A34-81AB-432B-8DAE-1953F412C126}" type="datetimeFigureOut">
               <a:rPr lang="en-US" dirty="0"/>
-              <a:t>6/18/2017</a:t>
+              <a:t>6/19/2017</a:t>
             </a:fld>
             <a:endParaRPr lang="en-US" dirty="0"/>
           </a:p>
@@ -8259,7 +9081,7 @@
           <a:p>
             <a:fld id="{48A87A34-81AB-432B-8DAE-1953F412C126}" type="datetimeFigureOut">
               <a:rPr lang="en-US" dirty="0"/>
-              <a:t>6/18/2017</a:t>
+              <a:t>6/19/2017</a:t>
             </a:fld>
             <a:endParaRPr lang="en-US" dirty="0"/>
           </a:p>
@@ -8349,7 +9171,7 @@
           <a:p>
             <a:fld id="{48A87A34-81AB-432B-8DAE-1953F412C126}" type="datetimeFigureOut">
               <a:rPr lang="en-US" dirty="0"/>
-              <a:t>6/18/2017</a:t>
+              <a:t>6/19/2017</a:t>
             </a:fld>
             <a:endParaRPr lang="en-US" dirty="0"/>
           </a:p>
@@ -8593,7 +9415,7 @@
           <a:p>
             <a:fld id="{48A87A34-81AB-432B-8DAE-1953F412C126}" type="datetimeFigureOut">
               <a:rPr lang="en-US" dirty="0"/>
-              <a:t>6/18/2017</a:t>
+              <a:t>6/19/2017</a:t>
             </a:fld>
             <a:endParaRPr lang="en-US" dirty="0"/>
           </a:p>
@@ -8868,7 +9690,7 @@
           <a:p>
             <a:fld id="{48A87A34-81AB-432B-8DAE-1953F412C126}" type="datetimeFigureOut">
               <a:rPr lang="en-US" dirty="0"/>
-              <a:t>6/18/2017</a:t>
+              <a:t>6/19/2017</a:t>
             </a:fld>
             <a:endParaRPr lang="en-US" dirty="0"/>
           </a:p>
@@ -8979,7 +9801,7 @@
           <a:noFill/>
           <a:extLst>
             <a:ext uri="{909E8E84-426E-40dd-AFC4-6F175D3DCCD1}">
-              <a14:hiddenFill xmlns="" xmlns:a14="http://schemas.microsoft.com/office/drawing/2010/main">
+              <a14:hiddenFill xmlns:a14="http://schemas.microsoft.com/office/drawing/2010/main" xmlns="">
                 <a:solidFill>
                   <a:srgbClr val="FFFFFF"/>
                 </a:solidFill>
@@ -9053,7 +9875,7 @@
               </a:ln>
               <a:extLst>
                 <a:ext uri="{91240B29-F687-4f45-9708-019B960494DF}">
-                  <a14:hiddenLine xmlns="" xmlns:a14="http://schemas.microsoft.com/office/drawing/2010/main" w="9525">
+                  <a14:hiddenLine xmlns:a14="http://schemas.microsoft.com/office/drawing/2010/main" xmlns="" w="9525">
                     <a:solidFill>
                       <a:srgbClr val="000000"/>
                     </a:solidFill>
@@ -9143,7 +9965,7 @@
               </a:ln>
               <a:extLst>
                 <a:ext uri="{91240B29-F687-4f45-9708-019B960494DF}">
-                  <a14:hiddenLine xmlns="" xmlns:a14="http://schemas.microsoft.com/office/drawing/2010/main" w="9525">
+                  <a14:hiddenLine xmlns:a14="http://schemas.microsoft.com/office/drawing/2010/main" xmlns="" w="9525">
                     <a:solidFill>
                       <a:srgbClr val="000000"/>
                     </a:solidFill>
@@ -9233,7 +10055,7 @@
               </a:ln>
               <a:extLst>
                 <a:ext uri="{91240B29-F687-4f45-9708-019B960494DF}">
-                  <a14:hiddenLine xmlns="" xmlns:a14="http://schemas.microsoft.com/office/drawing/2010/main" w="9525">
+                  <a14:hiddenLine xmlns:a14="http://schemas.microsoft.com/office/drawing/2010/main" xmlns="" w="9525">
                     <a:solidFill>
                       <a:srgbClr val="000000"/>
                     </a:solidFill>
@@ -9295,7 +10117,7 @@
               </a:ln>
               <a:extLst>
                 <a:ext uri="{91240B29-F687-4f45-9708-019B960494DF}">
-                  <a14:hiddenLine xmlns="" xmlns:a14="http://schemas.microsoft.com/office/drawing/2010/main" w="9525">
+                  <a14:hiddenLine xmlns:a14="http://schemas.microsoft.com/office/drawing/2010/main" xmlns="" w="9525">
                     <a:solidFill>
                       <a:srgbClr val="000000"/>
                     </a:solidFill>
@@ -9385,7 +10207,7 @@
               </a:ln>
               <a:extLst>
                 <a:ext uri="{91240B29-F687-4f45-9708-019B960494DF}">
-                  <a14:hiddenLine xmlns="" xmlns:a14="http://schemas.microsoft.com/office/drawing/2010/main" w="9525">
+                  <a14:hiddenLine xmlns:a14="http://schemas.microsoft.com/office/drawing/2010/main" xmlns="" w="9525">
                     <a:solidFill>
                       <a:srgbClr val="000000"/>
                     </a:solidFill>
@@ -9447,7 +10269,7 @@
               </a:ln>
               <a:extLst>
                 <a:ext uri="{91240B29-F687-4f45-9708-019B960494DF}">
-                  <a14:hiddenLine xmlns="" xmlns:a14="http://schemas.microsoft.com/office/drawing/2010/main" w="9525">
+                  <a14:hiddenLine xmlns:a14="http://schemas.microsoft.com/office/drawing/2010/main" xmlns="" w="9525">
                     <a:solidFill>
                       <a:srgbClr val="000000"/>
                     </a:solidFill>
@@ -9509,7 +10331,7 @@
               </a:ln>
               <a:extLst>
                 <a:ext uri="{91240B29-F687-4f45-9708-019B960494DF}">
-                  <a14:hiddenLine xmlns="" xmlns:a14="http://schemas.microsoft.com/office/drawing/2010/main" w="9525">
+                  <a14:hiddenLine xmlns:a14="http://schemas.microsoft.com/office/drawing/2010/main" xmlns="" w="9525">
                     <a:solidFill>
                       <a:srgbClr val="000000"/>
                     </a:solidFill>
@@ -9599,7 +10421,7 @@
               </a:ln>
               <a:extLst>
                 <a:ext uri="{91240B29-F687-4f45-9708-019B960494DF}">
-                  <a14:hiddenLine xmlns="" xmlns:a14="http://schemas.microsoft.com/office/drawing/2010/main" w="9525">
+                  <a14:hiddenLine xmlns:a14="http://schemas.microsoft.com/office/drawing/2010/main" xmlns="" w="9525">
                     <a:solidFill>
                       <a:srgbClr val="000000"/>
                     </a:solidFill>
@@ -9689,7 +10511,7 @@
               </a:ln>
               <a:extLst>
                 <a:ext uri="{91240B29-F687-4f45-9708-019B960494DF}">
-                  <a14:hiddenLine xmlns="" xmlns:a14="http://schemas.microsoft.com/office/drawing/2010/main" w="9525">
+                  <a14:hiddenLine xmlns:a14="http://schemas.microsoft.com/office/drawing/2010/main" xmlns="" w="9525">
                     <a:solidFill>
                       <a:srgbClr val="000000"/>
                     </a:solidFill>
@@ -9751,7 +10573,7 @@
               </a:ln>
               <a:extLst>
                 <a:ext uri="{91240B29-F687-4f45-9708-019B960494DF}">
-                  <a14:hiddenLine xmlns="" xmlns:a14="http://schemas.microsoft.com/office/drawing/2010/main" w="9525">
+                  <a14:hiddenLine xmlns:a14="http://schemas.microsoft.com/office/drawing/2010/main" xmlns="" w="9525">
                     <a:solidFill>
                       <a:srgbClr val="000000"/>
                     </a:solidFill>
@@ -9861,7 +10683,7 @@
               </a:ln>
               <a:extLst>
                 <a:ext uri="{91240B29-F687-4f45-9708-019B960494DF}">
-                  <a14:hiddenLine xmlns="" xmlns:a14="http://schemas.microsoft.com/office/drawing/2010/main" w="9525">
+                  <a14:hiddenLine xmlns:a14="http://schemas.microsoft.com/office/drawing/2010/main" xmlns="" w="9525">
                     <a:solidFill>
                       <a:srgbClr val="000000"/>
                     </a:solidFill>
@@ -9945,7 +10767,7 @@
               </a:ln>
               <a:extLst>
                 <a:ext uri="{91240B29-F687-4f45-9708-019B960494DF}">
-                  <a14:hiddenLine xmlns="" xmlns:a14="http://schemas.microsoft.com/office/drawing/2010/main" w="9525">
+                  <a14:hiddenLine xmlns:a14="http://schemas.microsoft.com/office/drawing/2010/main" xmlns="" w="9525">
                     <a:solidFill>
                       <a:srgbClr val="000000"/>
                     </a:solidFill>
@@ -10007,7 +10829,7 @@
               </a:ln>
               <a:extLst>
                 <a:ext uri="{91240B29-F687-4f45-9708-019B960494DF}">
-                  <a14:hiddenLine xmlns="" xmlns:a14="http://schemas.microsoft.com/office/drawing/2010/main" w="9525">
+                  <a14:hiddenLine xmlns:a14="http://schemas.microsoft.com/office/drawing/2010/main" xmlns="" w="9525">
                     <a:solidFill>
                       <a:srgbClr val="000000"/>
                     </a:solidFill>
@@ -10069,7 +10891,7 @@
               </a:ln>
               <a:extLst>
                 <a:ext uri="{91240B29-F687-4f45-9708-019B960494DF}">
-                  <a14:hiddenLine xmlns="" xmlns:a14="http://schemas.microsoft.com/office/drawing/2010/main" w="9525">
+                  <a14:hiddenLine xmlns:a14="http://schemas.microsoft.com/office/drawing/2010/main" xmlns="" w="9525">
                     <a:solidFill>
                       <a:srgbClr val="000000"/>
                     </a:solidFill>
@@ -10159,7 +10981,7 @@
               </a:ln>
               <a:extLst>
                 <a:ext uri="{91240B29-F687-4f45-9708-019B960494DF}">
-                  <a14:hiddenLine xmlns="" xmlns:a14="http://schemas.microsoft.com/office/drawing/2010/main" w="9525">
+                  <a14:hiddenLine xmlns:a14="http://schemas.microsoft.com/office/drawing/2010/main" xmlns="" w="9525">
                     <a:solidFill>
                       <a:srgbClr val="000000"/>
                     </a:solidFill>
@@ -10193,7 +11015,7 @@
               </a:ln>
               <a:extLst>
                 <a:ext uri="{91240B29-F687-4f45-9708-019B960494DF}">
-                  <a14:hiddenLine xmlns="" xmlns:a14="http://schemas.microsoft.com/office/drawing/2010/main" w="9525">
+                  <a14:hiddenLine xmlns:a14="http://schemas.microsoft.com/office/drawing/2010/main" xmlns="" w="9525">
                     <a:solidFill>
                       <a:srgbClr val="000000"/>
                     </a:solidFill>
@@ -10258,7 +11080,7 @@
               </a:ln>
               <a:extLst>
                 <a:ext uri="{91240B29-F687-4f45-9708-019B960494DF}">
-                  <a14:hiddenLine xmlns="" xmlns:a14="http://schemas.microsoft.com/office/drawing/2010/main" w="9525">
+                  <a14:hiddenLine xmlns:a14="http://schemas.microsoft.com/office/drawing/2010/main" xmlns="" w="9525">
                     <a:solidFill>
                       <a:srgbClr val="000000"/>
                     </a:solidFill>
@@ -10348,7 +11170,7 @@
               </a:ln>
               <a:extLst>
                 <a:ext uri="{91240B29-F687-4f45-9708-019B960494DF}">
-                  <a14:hiddenLine xmlns="" xmlns:a14="http://schemas.microsoft.com/office/drawing/2010/main" w="9525">
+                  <a14:hiddenLine xmlns:a14="http://schemas.microsoft.com/office/drawing/2010/main" xmlns="" w="9525">
                     <a:solidFill>
                       <a:srgbClr val="000000"/>
                     </a:solidFill>
@@ -10410,7 +11232,7 @@
               </a:ln>
               <a:extLst>
                 <a:ext uri="{91240B29-F687-4f45-9708-019B960494DF}">
-                  <a14:hiddenLine xmlns="" xmlns:a14="http://schemas.microsoft.com/office/drawing/2010/main" w="9525">
+                  <a14:hiddenLine xmlns:a14="http://schemas.microsoft.com/office/drawing/2010/main" xmlns="" w="9525">
                     <a:solidFill>
                       <a:srgbClr val="000000"/>
                     </a:solidFill>
@@ -10500,7 +11322,7 @@
               </a:ln>
               <a:extLst>
                 <a:ext uri="{91240B29-F687-4f45-9708-019B960494DF}">
-                  <a14:hiddenLine xmlns="" xmlns:a14="http://schemas.microsoft.com/office/drawing/2010/main" w="9525">
+                  <a14:hiddenLine xmlns:a14="http://schemas.microsoft.com/office/drawing/2010/main" xmlns="" w="9525">
                     <a:solidFill>
                       <a:srgbClr val="000000"/>
                     </a:solidFill>
@@ -10565,7 +11387,7 @@
               </a:ln>
               <a:extLst>
                 <a:ext uri="{91240B29-F687-4f45-9708-019B960494DF}">
-                  <a14:hiddenLine xmlns="" xmlns:a14="http://schemas.microsoft.com/office/drawing/2010/main" w="9525">
+                  <a14:hiddenLine xmlns:a14="http://schemas.microsoft.com/office/drawing/2010/main" xmlns="" w="9525">
                     <a:solidFill>
                       <a:srgbClr val="000000"/>
                     </a:solidFill>
@@ -10627,7 +11449,7 @@
               </a:ln>
               <a:extLst>
                 <a:ext uri="{91240B29-F687-4f45-9708-019B960494DF}">
-                  <a14:hiddenLine xmlns="" xmlns:a14="http://schemas.microsoft.com/office/drawing/2010/main" w="9525">
+                  <a14:hiddenLine xmlns:a14="http://schemas.microsoft.com/office/drawing/2010/main" xmlns="" w="9525">
                     <a:solidFill>
                       <a:srgbClr val="000000"/>
                     </a:solidFill>
@@ -10717,7 +11539,7 @@
               </a:ln>
               <a:extLst>
                 <a:ext uri="{91240B29-F687-4f45-9708-019B960494DF}">
-                  <a14:hiddenLine xmlns="" xmlns:a14="http://schemas.microsoft.com/office/drawing/2010/main" w="9525">
+                  <a14:hiddenLine xmlns:a14="http://schemas.microsoft.com/office/drawing/2010/main" xmlns="" w="9525">
                     <a:solidFill>
                       <a:srgbClr val="000000"/>
                     </a:solidFill>
@@ -10807,7 +11629,7 @@
               </a:ln>
               <a:extLst>
                 <a:ext uri="{91240B29-F687-4f45-9708-019B960494DF}">
-                  <a14:hiddenLine xmlns="" xmlns:a14="http://schemas.microsoft.com/office/drawing/2010/main" w="9525">
+                  <a14:hiddenLine xmlns:a14="http://schemas.microsoft.com/office/drawing/2010/main" xmlns="" w="9525">
                     <a:solidFill>
                       <a:srgbClr val="000000"/>
                     </a:solidFill>
@@ -10872,7 +11694,7 @@
               </a:ln>
               <a:extLst>
                 <a:ext uri="{91240B29-F687-4f45-9708-019B960494DF}">
-                  <a14:hiddenLine xmlns="" xmlns:a14="http://schemas.microsoft.com/office/drawing/2010/main" w="9525">
+                  <a14:hiddenLine xmlns:a14="http://schemas.microsoft.com/office/drawing/2010/main" xmlns="" w="9525">
                     <a:solidFill>
                       <a:srgbClr val="000000"/>
                     </a:solidFill>
@@ -10992,7 +11814,7 @@
               </a:ln>
               <a:extLst>
                 <a:ext uri="{91240B29-F687-4f45-9708-019B960494DF}">
-                  <a14:hiddenLine xmlns="" xmlns:a14="http://schemas.microsoft.com/office/drawing/2010/main" w="9525">
+                  <a14:hiddenLine xmlns:a14="http://schemas.microsoft.com/office/drawing/2010/main" xmlns="" w="9525">
                     <a:solidFill>
                       <a:srgbClr val="000000"/>
                     </a:solidFill>
@@ -11090,7 +11912,7 @@
               </a:ln>
               <a:extLst>
                 <a:ext uri="{91240B29-F687-4f45-9708-019B960494DF}">
-                  <a14:hiddenLine xmlns="" xmlns:a14="http://schemas.microsoft.com/office/drawing/2010/main" w="9525">
+                  <a14:hiddenLine xmlns:a14="http://schemas.microsoft.com/office/drawing/2010/main" xmlns="" w="9525">
                     <a:solidFill>
                       <a:srgbClr val="000000"/>
                     </a:solidFill>
@@ -11205,7 +12027,7 @@
               </a:ln>
               <a:extLst>
                 <a:ext uri="{91240B29-F687-4f45-9708-019B960494DF}">
-                  <a14:hiddenLine xmlns="" xmlns:a14="http://schemas.microsoft.com/office/drawing/2010/main" w="9525">
+                  <a14:hiddenLine xmlns:a14="http://schemas.microsoft.com/office/drawing/2010/main" xmlns="" w="9525">
                     <a:solidFill>
                       <a:srgbClr val="000000"/>
                     </a:solidFill>
@@ -11295,7 +12117,7 @@
               </a:ln>
               <a:extLst>
                 <a:ext uri="{91240B29-F687-4f45-9708-019B960494DF}">
-                  <a14:hiddenLine xmlns="" xmlns:a14="http://schemas.microsoft.com/office/drawing/2010/main" w="9525">
+                  <a14:hiddenLine xmlns:a14="http://schemas.microsoft.com/office/drawing/2010/main" xmlns="" w="9525">
                     <a:solidFill>
                       <a:srgbClr val="000000"/>
                     </a:solidFill>
@@ -11360,7 +12182,7 @@
               </a:ln>
               <a:extLst>
                 <a:ext uri="{91240B29-F687-4f45-9708-019B960494DF}">
-                  <a14:hiddenLine xmlns="" xmlns:a14="http://schemas.microsoft.com/office/drawing/2010/main" w="9525">
+                  <a14:hiddenLine xmlns:a14="http://schemas.microsoft.com/office/drawing/2010/main" xmlns="" w="9525">
                     <a:solidFill>
                       <a:srgbClr val="000000"/>
                     </a:solidFill>
@@ -11450,7 +12272,7 @@
               </a:ln>
               <a:extLst>
                 <a:ext uri="{91240B29-F687-4f45-9708-019B960494DF}">
-                  <a14:hiddenLine xmlns="" xmlns:a14="http://schemas.microsoft.com/office/drawing/2010/main" w="9525">
+                  <a14:hiddenLine xmlns:a14="http://schemas.microsoft.com/office/drawing/2010/main" xmlns="" w="9525">
                     <a:solidFill>
                       <a:srgbClr val="000000"/>
                     </a:solidFill>
@@ -11518,7 +12340,7 @@
               </a:ln>
               <a:extLst>
                 <a:ext uri="{91240B29-F687-4f45-9708-019B960494DF}">
-                  <a14:hiddenLine xmlns="" xmlns:a14="http://schemas.microsoft.com/office/drawing/2010/main" w="9525">
+                  <a14:hiddenLine xmlns:a14="http://schemas.microsoft.com/office/drawing/2010/main" xmlns="" w="9525">
                     <a:solidFill>
                       <a:srgbClr val="000000"/>
                     </a:solidFill>
@@ -11608,7 +12430,7 @@
               </a:ln>
               <a:extLst>
                 <a:ext uri="{91240B29-F687-4f45-9708-019B960494DF}">
-                  <a14:hiddenLine xmlns="" xmlns:a14="http://schemas.microsoft.com/office/drawing/2010/main" w="9525">
+                  <a14:hiddenLine xmlns:a14="http://schemas.microsoft.com/office/drawing/2010/main" xmlns="" w="9525">
                     <a:solidFill>
                       <a:srgbClr val="000000"/>
                     </a:solidFill>
@@ -11676,7 +12498,7 @@
               </a:ln>
               <a:extLst>
                 <a:ext uri="{91240B29-F687-4f45-9708-019B960494DF}">
-                  <a14:hiddenLine xmlns="" xmlns:a14="http://schemas.microsoft.com/office/drawing/2010/main" w="9525">
+                  <a14:hiddenLine xmlns:a14="http://schemas.microsoft.com/office/drawing/2010/main" xmlns="" w="9525">
                     <a:solidFill>
                       <a:srgbClr val="000000"/>
                     </a:solidFill>
@@ -11766,7 +12588,7 @@
               </a:ln>
               <a:extLst>
                 <a:ext uri="{91240B29-F687-4f45-9708-019B960494DF}">
-                  <a14:hiddenLine xmlns="" xmlns:a14="http://schemas.microsoft.com/office/drawing/2010/main" w="9525">
+                  <a14:hiddenLine xmlns:a14="http://schemas.microsoft.com/office/drawing/2010/main" xmlns="" w="9525">
                     <a:solidFill>
                       <a:srgbClr val="000000"/>
                     </a:solidFill>
@@ -11800,7 +12622,7 @@
               </a:ln>
               <a:extLst>
                 <a:ext uri="{91240B29-F687-4f45-9708-019B960494DF}">
-                  <a14:hiddenLine xmlns="" xmlns:a14="http://schemas.microsoft.com/office/drawing/2010/main" w="9525">
+                  <a14:hiddenLine xmlns:a14="http://schemas.microsoft.com/office/drawing/2010/main" xmlns="" w="9525">
                     <a:solidFill>
                       <a:srgbClr val="000000"/>
                     </a:solidFill>
@@ -11941,7 +12763,7 @@
             <a:fld id="{48A87A34-81AB-432B-8DAE-1953F412C126}" type="datetimeFigureOut">
               <a:rPr lang="en-US" dirty="0"/>
               <a:pPr/>
-              <a:t>6/18/2017</a:t>
+              <a:t>6/19/2017</a:t>
             </a:fld>
             <a:endParaRPr lang="en-US" dirty="0"/>
           </a:p>
@@ -12515,7 +13337,46 @@
           <a:bodyPr/>
           <a:lstStyle/>
           <a:p>
-            <a:endParaRPr lang="en-US" dirty="0"/>
+            <a:r>
+              <a:rPr lang="en-US" dirty="0"/>
+              <a:t>Use AWS </a:t>
+            </a:r>
+            <a:r>
+              <a:rPr lang="en-US" dirty="0" err="1"/>
+              <a:t>Rekognition</a:t>
+            </a:r>
+            <a:r>
+              <a:rPr lang="en-US" dirty="0"/>
+              <a:t> to build database of Celebrity-Image information</a:t>
+            </a:r>
+            <a:br>
+              <a:rPr lang="en-US" dirty="0"/>
+            </a:br>
+            <a:r>
+              <a:rPr lang="en-US" dirty="0"/>
+              <a:t>(Originally did not know about </a:t>
+            </a:r>
+            <a:r>
+              <a:rPr lang="en-US" i="1" dirty="0" err="1"/>
+              <a:t>recognizeCelebrity</a:t>
+            </a:r>
+            <a:r>
+              <a:rPr lang="en-US" dirty="0"/>
+              <a:t> API)</a:t>
+            </a:r>
+          </a:p>
+          <a:p>
+            <a:pPr lvl="1"/>
+            <a:r>
+              <a:rPr lang="en-US" dirty="0"/>
+              <a:t>Do facial analysis on images to capture faces (if any) in image; then do facial comparison with faces already in database. (Start w/ seed of faces w/ verified celebrity information.)</a:t>
+            </a:r>
+          </a:p>
+          <a:p>
+            <a:r>
+              <a:rPr lang="en-US" dirty="0"/>
+              <a:t>Website to access images and database to display information and images</a:t>
+            </a:r>
           </a:p>
         </p:txBody>
       </p:sp>
@@ -12595,13 +13456,13 @@
         </p:nvSpPr>
         <p:spPr>
           <a:xfrm>
-            <a:off x="1141412" y="2151529"/>
-            <a:ext cx="9905999" cy="3639673"/>
+            <a:off x="1141412" y="1760221"/>
+            <a:ext cx="9905999" cy="4030982"/>
           </a:xfrm>
         </p:spPr>
         <p:txBody>
           <a:bodyPr>
-            <a:normAutofit fontScale="70000" lnSpcReduction="20000"/>
+            <a:normAutofit fontScale="62500" lnSpcReduction="20000"/>
           </a:bodyPr>
           <a:lstStyle/>
           <a:p>
@@ -12611,7 +13472,58 @@
             </a:r>
             <a:r>
               <a:rPr lang="en-US" dirty="0"/>
-              <a:t> face-collection: stores face meta-data </a:t>
+              <a:t>:</a:t>
+            </a:r>
+          </a:p>
+          <a:p>
+            <a:pPr lvl="1"/>
+            <a:r>
+              <a:rPr lang="en-US" dirty="0"/>
+              <a:t>APIs: </a:t>
+            </a:r>
+            <a:r>
+              <a:rPr lang="en-US" dirty="0" err="1"/>
+              <a:t>indexFaces</a:t>
+            </a:r>
+            <a:r>
+              <a:rPr lang="en-US" dirty="0"/>
+              <a:t>, </a:t>
+            </a:r>
+            <a:r>
+              <a:rPr lang="en-US" dirty="0" err="1"/>
+              <a:t>searchFaces</a:t>
+            </a:r>
+            <a:r>
+              <a:rPr lang="en-US" dirty="0"/>
+              <a:t>, </a:t>
+            </a:r>
+            <a:r>
+              <a:rPr lang="en-US" dirty="0" err="1"/>
+              <a:t>getCelebrityInfo</a:t>
+            </a:r>
+            <a:r>
+              <a:rPr lang="en-US" dirty="0"/>
+              <a:t>, (TODO) </a:t>
+            </a:r>
+            <a:r>
+              <a:rPr lang="en-US" dirty="0" err="1"/>
+              <a:t>recognizeCelebrity</a:t>
+            </a:r>
+            <a:endParaRPr lang="en-US" dirty="0"/>
+          </a:p>
+          <a:p>
+            <a:pPr lvl="1"/>
+            <a:r>
+              <a:rPr lang="en-US" dirty="0"/>
+              <a:t>face-collection (stores face meta-data): </a:t>
+            </a:r>
+            <a:r>
+              <a:rPr lang="en-US" dirty="0" err="1"/>
+              <a:t>brsklar</a:t>
+            </a:r>
+            <a:r>
+              <a:rPr lang="en-US" dirty="0"/>
+              <a:t>-celebrity-images </a:t>
             </a:r>
             <a:br>
               <a:rPr lang="en-US" dirty="0"/>
@@ -12624,14 +13536,31 @@
           <a:p>
             <a:r>
               <a:rPr lang="en-US" dirty="0"/>
-              <a:t>S3 bucket for image file storage</a:t>
-            </a:r>
-          </a:p>
-          <a:p>
+              <a:t>S3 bucket: </a:t>
+            </a:r>
+            <a:r>
+              <a:rPr lang="en-US" dirty="0" err="1"/>
+              <a:t>benjaminsklar</a:t>
+            </a:r>
             <a:r>
               <a:rPr lang="en-US" dirty="0"/>
-              <a:t>DynamoDB tables:</a:t>
-            </a:r>
+              <a:t>-celebrity-images (for image file storage and website files)</a:t>
+            </a:r>
+          </a:p>
+          <a:p>
+            <a:r>
+              <a:rPr lang="en-US" dirty="0"/>
+              <a:t>DynamoDB </a:t>
+            </a:r>
+            <a:r>
+              <a:rPr lang="en-US" err="1"/>
+              <a:t>tables</a:t>
+            </a:r>
+            <a:r>
+              <a:rPr lang="en-US"/>
+              <a:t>:</a:t>
+            </a:r>
+            <a:endParaRPr lang="en-US" dirty="0"/>
           </a:p>
           <a:p>
             <a:pPr lvl="1"/>
@@ -12676,7 +13605,19 @@
             </a:r>
             <a:r>
               <a:rPr lang="en-US" dirty="0"/>
-              <a:t>: face data including source file, face meta-data</a:t>
+              <a:t>: face data including source file, face meta-data, id into face-collection </a:t>
+            </a:r>
+            <a:r>
+              <a:rPr lang="en-US" i="1" dirty="0" err="1"/>
+              <a:t>brsklar</a:t>
+            </a:r>
+            <a:r>
+              <a:rPr lang="en-US" i="1" dirty="0"/>
+              <a:t>-celebrity-images</a:t>
+            </a:r>
+            <a:r>
+              <a:rPr lang="en-US" dirty="0"/>
+              <a:t>.</a:t>
             </a:r>
           </a:p>
           <a:p>
@@ -12687,7 +13628,7 @@
             </a:r>
             <a:r>
               <a:rPr lang="en-US" dirty="0"/>
-              <a:t>: many-many face pairs with Similarity value</a:t>
+              <a:t>: many-many face-id pairs with Similarity value</a:t>
             </a:r>
           </a:p>
           <a:p>
@@ -12790,6 +13731,1166 @@
 </file>
 
 <file path=ppt/slides/slide4.xml><?xml version="1.0" encoding="utf-8"?>
+<p:sld xmlns:a="http://schemas.openxmlformats.org/drawingml/2006/main" xmlns:r="http://schemas.openxmlformats.org/officeDocument/2006/relationships" xmlns:p="http://schemas.openxmlformats.org/presentationml/2006/main">
+  <p:cSld>
+    <p:spTree>
+      <p:nvGrpSpPr>
+        <p:cNvPr id="1" name=""/>
+        <p:cNvGrpSpPr/>
+        <p:nvPr/>
+      </p:nvGrpSpPr>
+      <p:grpSpPr>
+        <a:xfrm>
+          <a:off x="0" y="0"/>
+          <a:ext cx="0" cy="0"/>
+          <a:chOff x="0" y="0"/>
+          <a:chExt cx="0" cy="0"/>
+        </a:xfrm>
+      </p:grpSpPr>
+      <p:sp>
+        <p:nvSpPr>
+          <p:cNvPr id="4" name="TextBox 3">
+            <a:extLst>
+              <a:ext uri="{FF2B5EF4-FFF2-40B4-BE49-F238E27FC236}">
+                <a16:creationId xmlns:a16="http://schemas.microsoft.com/office/drawing/2014/main" id="{D08D813B-70DB-4C48-9B0F-8C3BC8966807}"/>
+              </a:ext>
+            </a:extLst>
+          </p:cNvPr>
+          <p:cNvSpPr txBox="1"/>
+          <p:nvPr/>
+        </p:nvSpPr>
+        <p:spPr>
+          <a:xfrm>
+            <a:off x="5507594" y="4248026"/>
+            <a:ext cx="536092" cy="274320"/>
+          </a:xfrm>
+          <a:prstGeom prst="rect">
+            <a:avLst/>
+          </a:prstGeom>
+          <a:noFill/>
+        </p:spPr>
+        <p:txBody>
+          <a:bodyPr wrap="square" lIns="0" tIns="0" rIns="0" bIns="0" rtlCol="0" anchor="t">
+            <a:noAutofit/>
+          </a:bodyPr>
+          <a:lstStyle/>
+          <a:p>
+            <a:pPr algn="ctr"/>
+            <a:r>
+              <a:rPr lang="en-US" sz="800" b="1" dirty="0" err="1"/>
+              <a:t>trigCelebrityImages</a:t>
+            </a:r>
+            <a:endParaRPr lang="en-US" sz="1400" b="1" dirty="0"/>
+          </a:p>
+        </p:txBody>
+      </p:sp>
+      <p:pic>
+        <p:nvPicPr>
+          <p:cNvPr id="5" name="Picture 4">
+            <a:extLst>
+              <a:ext uri="{FF2B5EF4-FFF2-40B4-BE49-F238E27FC236}">
+                <a16:creationId xmlns:a16="http://schemas.microsoft.com/office/drawing/2014/main" id="{4800CB8F-C93B-4FD1-B9E6-54574F768AC5}"/>
+              </a:ext>
+            </a:extLst>
+          </p:cNvPr>
+          <p:cNvPicPr>
+            <a:picLocks noChangeAspect="1"/>
+          </p:cNvPicPr>
+          <p:nvPr/>
+        </p:nvPicPr>
+        <p:blipFill>
+          <a:blip r:embed="rId3">
+            <a:extLst>
+              <a:ext uri="{28A0092B-C50C-407E-A947-70E740481C1C}">
+                <a14:useLocalDpi xmlns:a14="http://schemas.microsoft.com/office/drawing/2010/main" val="0"/>
+              </a:ext>
+            </a:extLst>
+          </a:blip>
+          <a:stretch>
+            <a:fillRect/>
+          </a:stretch>
+        </p:blipFill>
+        <p:spPr>
+          <a:xfrm>
+            <a:off x="5484502" y="3565945"/>
+            <a:ext cx="543639" cy="564959"/>
+          </a:xfrm>
+          <a:prstGeom prst="rect">
+            <a:avLst/>
+          </a:prstGeom>
+        </p:spPr>
+      </p:pic>
+      <p:sp>
+        <p:nvSpPr>
+          <p:cNvPr id="6" name="TextBox 5">
+            <a:extLst>
+              <a:ext uri="{FF2B5EF4-FFF2-40B4-BE49-F238E27FC236}">
+                <a16:creationId xmlns:a16="http://schemas.microsoft.com/office/drawing/2014/main" id="{E736D4F1-4705-464E-A0A0-9C359724AC8E}"/>
+              </a:ext>
+            </a:extLst>
+          </p:cNvPr>
+          <p:cNvSpPr txBox="1"/>
+          <p:nvPr/>
+        </p:nvSpPr>
+        <p:spPr>
+          <a:xfrm>
+            <a:off x="7664634" y="4248026"/>
+            <a:ext cx="770586" cy="274320"/>
+          </a:xfrm>
+          <a:prstGeom prst="rect">
+            <a:avLst/>
+          </a:prstGeom>
+          <a:noFill/>
+        </p:spPr>
+        <p:txBody>
+          <a:bodyPr wrap="square" lIns="0" tIns="0" rIns="0" bIns="0" rtlCol="0" anchor="t">
+            <a:noAutofit/>
+          </a:bodyPr>
+          <a:lstStyle/>
+          <a:p>
+            <a:pPr algn="ctr"/>
+            <a:r>
+              <a:rPr lang="en-US" sz="800" b="1" dirty="0" err="1"/>
+              <a:t>trigCelebrityFaces</a:t>
+            </a:r>
+            <a:endParaRPr lang="en-US" sz="1400" b="1" dirty="0"/>
+          </a:p>
+        </p:txBody>
+      </p:sp>
+      <p:pic>
+        <p:nvPicPr>
+          <p:cNvPr id="7" name="Picture 6">
+            <a:extLst>
+              <a:ext uri="{FF2B5EF4-FFF2-40B4-BE49-F238E27FC236}">
+                <a16:creationId xmlns:a16="http://schemas.microsoft.com/office/drawing/2014/main" id="{511641DF-6FF7-47EF-B9FC-692DFBDCB056}"/>
+              </a:ext>
+            </a:extLst>
+          </p:cNvPr>
+          <p:cNvPicPr>
+            <a:picLocks noChangeAspect="1"/>
+          </p:cNvPicPr>
+          <p:nvPr/>
+        </p:nvPicPr>
+        <p:blipFill>
+          <a:blip r:embed="rId3">
+            <a:extLst>
+              <a:ext uri="{28A0092B-C50C-407E-A947-70E740481C1C}">
+                <a14:useLocalDpi xmlns:a14="http://schemas.microsoft.com/office/drawing/2010/main" val="0"/>
+              </a:ext>
+            </a:extLst>
+          </a:blip>
+          <a:stretch>
+            <a:fillRect/>
+          </a:stretch>
+        </p:blipFill>
+        <p:spPr>
+          <a:xfrm>
+            <a:off x="7778108" y="3565945"/>
+            <a:ext cx="543639" cy="564959"/>
+          </a:xfrm>
+          <a:prstGeom prst="rect">
+            <a:avLst/>
+          </a:prstGeom>
+        </p:spPr>
+      </p:pic>
+      <p:sp>
+        <p:nvSpPr>
+          <p:cNvPr id="10" name="TextBox 9">
+            <a:extLst>
+              <a:ext uri="{FF2B5EF4-FFF2-40B4-BE49-F238E27FC236}">
+                <a16:creationId xmlns:a16="http://schemas.microsoft.com/office/drawing/2014/main" id="{DA677B75-C7ED-4279-8BCF-7435994A19DA}"/>
+              </a:ext>
+            </a:extLst>
+          </p:cNvPr>
+          <p:cNvSpPr txBox="1"/>
+          <p:nvPr/>
+        </p:nvSpPr>
+        <p:spPr>
+          <a:xfrm>
+            <a:off x="4320544" y="2870790"/>
+            <a:ext cx="640080" cy="274320"/>
+          </a:xfrm>
+          <a:prstGeom prst="rect">
+            <a:avLst/>
+          </a:prstGeom>
+          <a:noFill/>
+        </p:spPr>
+        <p:txBody>
+          <a:bodyPr wrap="square" lIns="0" tIns="0" rIns="0" bIns="0" rtlCol="0" anchor="t">
+            <a:noAutofit/>
+          </a:bodyPr>
+          <a:lstStyle/>
+          <a:p>
+            <a:pPr algn="ctr"/>
+            <a:r>
+              <a:rPr lang="en-US" sz="800" b="1" dirty="0" err="1"/>
+              <a:t>Benjaminsklar</a:t>
+            </a:r>
+            <a:r>
+              <a:rPr lang="en-US" sz="800" b="1" dirty="0"/>
+              <a:t>-celebrity-images</a:t>
+            </a:r>
+            <a:endParaRPr lang="en-US" sz="1400" b="1" dirty="0"/>
+          </a:p>
+        </p:txBody>
+      </p:sp>
+      <p:pic>
+        <p:nvPicPr>
+          <p:cNvPr id="11" name="Picture 10">
+            <a:extLst>
+              <a:ext uri="{FF2B5EF4-FFF2-40B4-BE49-F238E27FC236}">
+                <a16:creationId xmlns:a16="http://schemas.microsoft.com/office/drawing/2014/main" id="{DEAE06BF-C2AB-430B-AC98-FB6C869E5A6C}"/>
+              </a:ext>
+            </a:extLst>
+          </p:cNvPr>
+          <p:cNvPicPr>
+            <a:picLocks noChangeAspect="1"/>
+          </p:cNvPicPr>
+          <p:nvPr/>
+        </p:nvPicPr>
+        <p:blipFill>
+          <a:blip r:embed="rId4">
+            <a:extLst>
+              <a:ext uri="{28A0092B-C50C-407E-A947-70E740481C1C}">
+                <a14:useLocalDpi xmlns:a14="http://schemas.microsoft.com/office/drawing/2010/main" val="0"/>
+              </a:ext>
+            </a:extLst>
+          </a:blip>
+          <a:stretch>
+            <a:fillRect/>
+          </a:stretch>
+        </p:blipFill>
+        <p:spPr>
+          <a:xfrm>
+            <a:off x="4370928" y="2130676"/>
+            <a:ext cx="543745" cy="563883"/>
+          </a:xfrm>
+          <a:prstGeom prst="rect">
+            <a:avLst/>
+          </a:prstGeom>
+        </p:spPr>
+      </p:pic>
+      <p:sp>
+        <p:nvSpPr>
+          <p:cNvPr id="12" name="TextBox 11">
+            <a:extLst>
+              <a:ext uri="{FF2B5EF4-FFF2-40B4-BE49-F238E27FC236}">
+                <a16:creationId xmlns:a16="http://schemas.microsoft.com/office/drawing/2014/main" id="{DBE966C4-56D7-42C8-BEAF-682B0748CA47}"/>
+              </a:ext>
+            </a:extLst>
+          </p:cNvPr>
+          <p:cNvSpPr txBox="1"/>
+          <p:nvPr/>
+        </p:nvSpPr>
+        <p:spPr>
+          <a:xfrm>
+            <a:off x="8873894" y="4215916"/>
+            <a:ext cx="640080" cy="274320"/>
+          </a:xfrm>
+          <a:prstGeom prst="rect">
+            <a:avLst/>
+          </a:prstGeom>
+          <a:noFill/>
+        </p:spPr>
+        <p:txBody>
+          <a:bodyPr wrap="square" lIns="0" tIns="0" rIns="0" bIns="0" rtlCol="0" anchor="t">
+            <a:noAutofit/>
+          </a:bodyPr>
+          <a:lstStyle/>
+          <a:p>
+            <a:pPr algn="ctr"/>
+            <a:r>
+              <a:rPr lang="en-US" sz="800" b="1" dirty="0" err="1"/>
+              <a:t>CelebrityFaceMatches</a:t>
+            </a:r>
+            <a:endParaRPr lang="en-US" sz="1400" b="1" dirty="0"/>
+          </a:p>
+        </p:txBody>
+      </p:sp>
+      <p:pic>
+        <p:nvPicPr>
+          <p:cNvPr id="13" name="Picture 12">
+            <a:extLst>
+              <a:ext uri="{FF2B5EF4-FFF2-40B4-BE49-F238E27FC236}">
+                <a16:creationId xmlns:a16="http://schemas.microsoft.com/office/drawing/2014/main" id="{965B984E-4609-41C5-A15C-472AEB1C44A0}"/>
+              </a:ext>
+            </a:extLst>
+          </p:cNvPr>
+          <p:cNvPicPr>
+            <a:picLocks noChangeAspect="1"/>
+          </p:cNvPicPr>
+          <p:nvPr/>
+        </p:nvPicPr>
+        <p:blipFill>
+          <a:blip r:embed="rId5">
+            <a:extLst>
+              <a:ext uri="{28A0092B-C50C-407E-A947-70E740481C1C}">
+                <a14:useLocalDpi xmlns:a14="http://schemas.microsoft.com/office/drawing/2010/main" val="0"/>
+              </a:ext>
+            </a:extLst>
+          </a:blip>
+          <a:stretch>
+            <a:fillRect/>
+          </a:stretch>
+        </p:blipFill>
+        <p:spPr>
+          <a:xfrm>
+            <a:off x="8951386" y="3608764"/>
+            <a:ext cx="487309" cy="479320"/>
+          </a:xfrm>
+          <a:prstGeom prst="rect">
+            <a:avLst/>
+          </a:prstGeom>
+        </p:spPr>
+      </p:pic>
+      <p:sp>
+        <p:nvSpPr>
+          <p:cNvPr id="14" name="TextBox 13">
+            <a:extLst>
+              <a:ext uri="{FF2B5EF4-FFF2-40B4-BE49-F238E27FC236}">
+                <a16:creationId xmlns:a16="http://schemas.microsoft.com/office/drawing/2014/main" id="{89694CC5-20E2-4402-B5ED-FCECC362C2C5}"/>
+              </a:ext>
+            </a:extLst>
+          </p:cNvPr>
+          <p:cNvSpPr txBox="1"/>
+          <p:nvPr/>
+        </p:nvSpPr>
+        <p:spPr>
+          <a:xfrm>
+            <a:off x="6583665" y="4219707"/>
+            <a:ext cx="640080" cy="274320"/>
+          </a:xfrm>
+          <a:prstGeom prst="rect">
+            <a:avLst/>
+          </a:prstGeom>
+          <a:noFill/>
+        </p:spPr>
+        <p:txBody>
+          <a:bodyPr wrap="square" lIns="0" tIns="0" rIns="0" bIns="0" rtlCol="0" anchor="t">
+            <a:noAutofit/>
+          </a:bodyPr>
+          <a:lstStyle/>
+          <a:p>
+            <a:pPr algn="ctr"/>
+            <a:r>
+              <a:rPr lang="en-US" sz="800" b="1" dirty="0" err="1"/>
+              <a:t>CelebrityFaces</a:t>
+            </a:r>
+            <a:endParaRPr lang="en-US" sz="1400" b="1" dirty="0"/>
+          </a:p>
+        </p:txBody>
+      </p:sp>
+      <p:pic>
+        <p:nvPicPr>
+          <p:cNvPr id="15" name="Picture 14">
+            <a:extLst>
+              <a:ext uri="{FF2B5EF4-FFF2-40B4-BE49-F238E27FC236}">
+                <a16:creationId xmlns:a16="http://schemas.microsoft.com/office/drawing/2014/main" id="{F0539F68-FEC6-48D5-9F18-7C8E328A7629}"/>
+              </a:ext>
+            </a:extLst>
+          </p:cNvPr>
+          <p:cNvPicPr>
+            <a:picLocks noChangeAspect="1"/>
+          </p:cNvPicPr>
+          <p:nvPr/>
+        </p:nvPicPr>
+        <p:blipFill>
+          <a:blip r:embed="rId5">
+            <a:extLst>
+              <a:ext uri="{28A0092B-C50C-407E-A947-70E740481C1C}">
+                <a14:useLocalDpi xmlns:a14="http://schemas.microsoft.com/office/drawing/2010/main" val="0"/>
+              </a:ext>
+            </a:extLst>
+          </a:blip>
+          <a:stretch>
+            <a:fillRect/>
+          </a:stretch>
+        </p:blipFill>
+        <p:spPr>
+          <a:xfrm>
+            <a:off x="6661158" y="3608764"/>
+            <a:ext cx="487309" cy="479320"/>
+          </a:xfrm>
+          <a:prstGeom prst="rect">
+            <a:avLst/>
+          </a:prstGeom>
+        </p:spPr>
+      </p:pic>
+      <p:sp>
+        <p:nvSpPr>
+          <p:cNvPr id="16" name="TextBox 15">
+            <a:extLst>
+              <a:ext uri="{FF2B5EF4-FFF2-40B4-BE49-F238E27FC236}">
+                <a16:creationId xmlns:a16="http://schemas.microsoft.com/office/drawing/2014/main" id="{609F85CD-56C9-4F4B-98B2-C7B10C5C7552}"/>
+              </a:ext>
+            </a:extLst>
+          </p:cNvPr>
+          <p:cNvSpPr txBox="1"/>
+          <p:nvPr/>
+        </p:nvSpPr>
+        <p:spPr>
+          <a:xfrm>
+            <a:off x="4266328" y="4215916"/>
+            <a:ext cx="667188" cy="274320"/>
+          </a:xfrm>
+          <a:prstGeom prst="rect">
+            <a:avLst/>
+          </a:prstGeom>
+          <a:noFill/>
+        </p:spPr>
+        <p:txBody>
+          <a:bodyPr wrap="square" lIns="0" tIns="0" rIns="0" bIns="0" rtlCol="0" anchor="t">
+            <a:noAutofit/>
+          </a:bodyPr>
+          <a:lstStyle/>
+          <a:p>
+            <a:pPr algn="ctr"/>
+            <a:r>
+              <a:rPr lang="en-US" sz="800" b="1" dirty="0" err="1"/>
+              <a:t>CelebrityImageFiles</a:t>
+            </a:r>
+            <a:endParaRPr lang="en-US" sz="1400" b="1" dirty="0"/>
+          </a:p>
+        </p:txBody>
+      </p:sp>
+      <p:pic>
+        <p:nvPicPr>
+          <p:cNvPr id="17" name="Picture 16">
+            <a:extLst>
+              <a:ext uri="{FF2B5EF4-FFF2-40B4-BE49-F238E27FC236}">
+                <a16:creationId xmlns:a16="http://schemas.microsoft.com/office/drawing/2014/main" id="{E5862B89-6456-4E9A-90FF-A434EBA7D466}"/>
+              </a:ext>
+            </a:extLst>
+          </p:cNvPr>
+          <p:cNvPicPr>
+            <a:picLocks noChangeAspect="1"/>
+          </p:cNvPicPr>
+          <p:nvPr/>
+        </p:nvPicPr>
+        <p:blipFill>
+          <a:blip r:embed="rId5">
+            <a:extLst>
+              <a:ext uri="{28A0092B-C50C-407E-A947-70E740481C1C}">
+                <a14:useLocalDpi xmlns:a14="http://schemas.microsoft.com/office/drawing/2010/main" val="0"/>
+              </a:ext>
+            </a:extLst>
+          </a:blip>
+          <a:stretch>
+            <a:fillRect/>
+          </a:stretch>
+        </p:blipFill>
+        <p:spPr>
+          <a:xfrm>
+            <a:off x="4370928" y="3608764"/>
+            <a:ext cx="487309" cy="479320"/>
+          </a:xfrm>
+          <a:prstGeom prst="rect">
+            <a:avLst/>
+          </a:prstGeom>
+        </p:spPr>
+      </p:pic>
+      <p:pic>
+        <p:nvPicPr>
+          <p:cNvPr id="18" name="Picture 17">
+            <a:extLst>
+              <a:ext uri="{FF2B5EF4-FFF2-40B4-BE49-F238E27FC236}">
+                <a16:creationId xmlns:a16="http://schemas.microsoft.com/office/drawing/2014/main" id="{751AAAC0-3EDE-4F27-9B36-DE1551C07B92}"/>
+              </a:ext>
+            </a:extLst>
+          </p:cNvPr>
+          <p:cNvPicPr>
+            <a:picLocks noChangeAspect="1"/>
+          </p:cNvPicPr>
+          <p:nvPr/>
+        </p:nvPicPr>
+        <p:blipFill>
+          <a:blip r:embed="rId6">
+            <a:extLst>
+              <a:ext uri="{28A0092B-C50C-407E-A947-70E740481C1C}">
+                <a14:useLocalDpi xmlns:a14="http://schemas.microsoft.com/office/drawing/2010/main" val="0"/>
+              </a:ext>
+            </a:extLst>
+          </a:blip>
+          <a:stretch>
+            <a:fillRect/>
+          </a:stretch>
+        </p:blipFill>
+        <p:spPr>
+          <a:xfrm>
+            <a:off x="6615233" y="4876390"/>
+            <a:ext cx="533234" cy="643018"/>
+          </a:xfrm>
+          <a:prstGeom prst="rect">
+            <a:avLst/>
+          </a:prstGeom>
+        </p:spPr>
+      </p:pic>
+      <p:sp>
+        <p:nvSpPr>
+          <p:cNvPr id="19" name="TextBox 18">
+            <a:extLst>
+              <a:ext uri="{FF2B5EF4-FFF2-40B4-BE49-F238E27FC236}">
+                <a16:creationId xmlns:a16="http://schemas.microsoft.com/office/drawing/2014/main" id="{E1527421-5C8C-409F-A69D-F8EC6D78CC8A}"/>
+              </a:ext>
+            </a:extLst>
+          </p:cNvPr>
+          <p:cNvSpPr txBox="1"/>
+          <p:nvPr/>
+        </p:nvSpPr>
+        <p:spPr>
+          <a:xfrm>
+            <a:off x="6410075" y="5547973"/>
+            <a:ext cx="943550" cy="155448"/>
+          </a:xfrm>
+          <a:prstGeom prst="rect">
+            <a:avLst/>
+          </a:prstGeom>
+          <a:noFill/>
+        </p:spPr>
+        <p:txBody>
+          <a:bodyPr wrap="square" lIns="0" tIns="0" rIns="0" bIns="0" rtlCol="0" anchor="t">
+            <a:noAutofit/>
+          </a:bodyPr>
+          <a:lstStyle/>
+          <a:p>
+            <a:pPr algn="ctr"/>
+            <a:r>
+              <a:rPr lang="en-US" sz="1000" b="1" dirty="0"/>
+              <a:t>Amazon </a:t>
+            </a:r>
+            <a:r>
+              <a:rPr lang="en-US" sz="1000" b="1" dirty="0" err="1"/>
+              <a:t>Rekognition</a:t>
+            </a:r>
+            <a:endParaRPr lang="en-US" sz="1000" b="1" dirty="0"/>
+          </a:p>
+        </p:txBody>
+      </p:sp>
+      <p:pic>
+        <p:nvPicPr>
+          <p:cNvPr id="20" name="Picture 19">
+            <a:extLst>
+              <a:ext uri="{FF2B5EF4-FFF2-40B4-BE49-F238E27FC236}">
+                <a16:creationId xmlns:a16="http://schemas.microsoft.com/office/drawing/2014/main" id="{C865A238-E289-4E90-A4F2-190A8C334A66}"/>
+              </a:ext>
+            </a:extLst>
+          </p:cNvPr>
+          <p:cNvPicPr>
+            <a:picLocks noChangeAspect="1"/>
+          </p:cNvPicPr>
+          <p:nvPr/>
+        </p:nvPicPr>
+        <p:blipFill>
+          <a:blip r:embed="rId7">
+            <a:extLst>
+              <a:ext uri="{28A0092B-C50C-407E-A947-70E740481C1C}">
+                <a14:useLocalDpi xmlns:a14="http://schemas.microsoft.com/office/drawing/2010/main" val="0"/>
+              </a:ext>
+            </a:extLst>
+          </a:blip>
+          <a:stretch>
+            <a:fillRect/>
+          </a:stretch>
+        </p:blipFill>
+        <p:spPr>
+          <a:xfrm>
+            <a:off x="3293512" y="1750026"/>
+            <a:ext cx="519942" cy="623930"/>
+          </a:xfrm>
+          <a:prstGeom prst="rect">
+            <a:avLst/>
+          </a:prstGeom>
+        </p:spPr>
+      </p:pic>
+      <p:sp>
+        <p:nvSpPr>
+          <p:cNvPr id="21" name="TextBox 20">
+            <a:extLst>
+              <a:ext uri="{FF2B5EF4-FFF2-40B4-BE49-F238E27FC236}">
+                <a16:creationId xmlns:a16="http://schemas.microsoft.com/office/drawing/2014/main" id="{BA287DF8-0816-4B1B-BD0C-211EA9AF4DA8}"/>
+              </a:ext>
+            </a:extLst>
+          </p:cNvPr>
+          <p:cNvSpPr txBox="1"/>
+          <p:nvPr/>
+        </p:nvSpPr>
+        <p:spPr>
+          <a:xfrm>
+            <a:off x="3104886" y="2450700"/>
+            <a:ext cx="894752" cy="155632"/>
+          </a:xfrm>
+          <a:prstGeom prst="rect">
+            <a:avLst/>
+          </a:prstGeom>
+          <a:noFill/>
+        </p:spPr>
+        <p:txBody>
+          <a:bodyPr wrap="square" lIns="0" tIns="0" rIns="0" bIns="0" rtlCol="0" anchor="t">
+            <a:noAutofit/>
+          </a:bodyPr>
+          <a:lstStyle/>
+          <a:p>
+            <a:pPr algn="ctr"/>
+            <a:r>
+              <a:rPr lang="en-US" sz="1000" b="1" dirty="0"/>
+              <a:t>Amazon</a:t>
+            </a:r>
+            <a:br>
+              <a:rPr lang="en-US" sz="1000" b="1" dirty="0"/>
+            </a:br>
+            <a:r>
+              <a:rPr lang="en-US" sz="1000" b="1" dirty="0" err="1"/>
+              <a:t>Cognito</a:t>
+            </a:r>
+            <a:endParaRPr lang="en-US" b="1" dirty="0"/>
+          </a:p>
+        </p:txBody>
+      </p:sp>
+      <p:sp>
+        <p:nvSpPr>
+          <p:cNvPr id="22" name="Rounded Rectangle 2">
+            <a:extLst>
+              <a:ext uri="{FF2B5EF4-FFF2-40B4-BE49-F238E27FC236}">
+                <a16:creationId xmlns:a16="http://schemas.microsoft.com/office/drawing/2014/main" id="{F64A9497-2EC3-4DB4-AEAF-D8C4E935B1B0}"/>
+              </a:ext>
+            </a:extLst>
+          </p:cNvPr>
+          <p:cNvSpPr/>
+          <p:nvPr/>
+        </p:nvSpPr>
+        <p:spPr>
+          <a:xfrm>
+            <a:off x="2748916" y="1338292"/>
+            <a:ext cx="7246620" cy="4673888"/>
+          </a:xfrm>
+          <a:prstGeom prst="roundRect">
+            <a:avLst>
+              <a:gd name="adj" fmla="val 9818"/>
+            </a:avLst>
+          </a:prstGeom>
+          <a:noFill/>
+          <a:ln w="6350">
+            <a:solidFill>
+              <a:schemeClr val="tx1"/>
+            </a:solidFill>
+            <a:prstDash val="solid"/>
+          </a:ln>
+          <a:effectLst/>
+        </p:spPr>
+        <p:style>
+          <a:lnRef idx="1">
+            <a:schemeClr val="accent1"/>
+          </a:lnRef>
+          <a:fillRef idx="3">
+            <a:schemeClr val="accent1"/>
+          </a:fillRef>
+          <a:effectRef idx="2">
+            <a:schemeClr val="accent1"/>
+          </a:effectRef>
+          <a:fontRef idx="minor">
+            <a:schemeClr val="lt1"/>
+          </a:fontRef>
+        </p:style>
+        <p:txBody>
+          <a:bodyPr anchor="ctr"/>
+          <a:lstStyle/>
+          <a:p>
+            <a:pPr algn="ctr" fontAlgn="auto">
+              <a:spcBef>
+                <a:spcPts val="0"/>
+              </a:spcBef>
+              <a:spcAft>
+                <a:spcPts val="0"/>
+              </a:spcAft>
+              <a:defRPr/>
+            </a:pPr>
+            <a:endParaRPr lang="en-US" dirty="0">
+              <a:solidFill>
+                <a:schemeClr val="tx1"/>
+              </a:solidFill>
+              <a:latin typeface="Arial"/>
+              <a:cs typeface="Arial"/>
+            </a:endParaRPr>
+          </a:p>
+        </p:txBody>
+      </p:sp>
+      <p:pic>
+        <p:nvPicPr>
+          <p:cNvPr id="24" name="Picture 23">
+            <a:extLst>
+              <a:ext uri="{FF2B5EF4-FFF2-40B4-BE49-F238E27FC236}">
+                <a16:creationId xmlns:a16="http://schemas.microsoft.com/office/drawing/2014/main" id="{9891B060-AEEA-40F3-A8E4-7458320BB219}"/>
+              </a:ext>
+            </a:extLst>
+          </p:cNvPr>
+          <p:cNvPicPr>
+            <a:picLocks noChangeAspect="1"/>
+          </p:cNvPicPr>
+          <p:nvPr/>
+        </p:nvPicPr>
+        <p:blipFill>
+          <a:blip r:embed="rId8">
+            <a:extLst>
+              <a:ext uri="{28A0092B-C50C-407E-A947-70E740481C1C}">
+                <a14:useLocalDpi xmlns:a14="http://schemas.microsoft.com/office/drawing/2010/main" val="0"/>
+              </a:ext>
+            </a:extLst>
+          </a:blip>
+          <a:stretch>
+            <a:fillRect/>
+          </a:stretch>
+        </p:blipFill>
+        <p:spPr>
+          <a:xfrm>
+            <a:off x="5762481" y="1074453"/>
+            <a:ext cx="906241" cy="591574"/>
+          </a:xfrm>
+          <a:prstGeom prst="rect">
+            <a:avLst/>
+          </a:prstGeom>
+        </p:spPr>
+      </p:pic>
+      <p:cxnSp>
+        <p:nvCxnSpPr>
+          <p:cNvPr id="43" name="Connector: Elbow 42">
+            <a:extLst>
+              <a:ext uri="{FF2B5EF4-FFF2-40B4-BE49-F238E27FC236}">
+                <a16:creationId xmlns:a16="http://schemas.microsoft.com/office/drawing/2014/main" id="{AE49D927-EF52-4C47-B773-12C29155852D}"/>
+              </a:ext>
+            </a:extLst>
+          </p:cNvPr>
+          <p:cNvCxnSpPr>
+            <a:cxnSpLocks/>
+            <a:stCxn id="17" idx="3"/>
+            <a:endCxn id="5" idx="1"/>
+          </p:cNvCxnSpPr>
+          <p:nvPr/>
+        </p:nvCxnSpPr>
+        <p:spPr>
+          <a:xfrm>
+            <a:off x="4858237" y="3848424"/>
+            <a:ext cx="626265" cy="1"/>
+          </a:xfrm>
+          <a:prstGeom prst="bentConnector3">
+            <a:avLst/>
+          </a:prstGeom>
+          <a:ln w="19050">
+            <a:tailEnd type="triangle"/>
+          </a:ln>
+        </p:spPr>
+        <p:style>
+          <a:lnRef idx="1">
+            <a:schemeClr val="accent1"/>
+          </a:lnRef>
+          <a:fillRef idx="0">
+            <a:schemeClr val="accent1"/>
+          </a:fillRef>
+          <a:effectRef idx="0">
+            <a:schemeClr val="accent1"/>
+          </a:effectRef>
+          <a:fontRef idx="minor">
+            <a:schemeClr val="tx1"/>
+          </a:fontRef>
+        </p:style>
+      </p:cxnSp>
+      <p:cxnSp>
+        <p:nvCxnSpPr>
+          <p:cNvPr id="46" name="Connector: Elbow 45">
+            <a:extLst>
+              <a:ext uri="{FF2B5EF4-FFF2-40B4-BE49-F238E27FC236}">
+                <a16:creationId xmlns:a16="http://schemas.microsoft.com/office/drawing/2014/main" id="{A7C0F2C8-004B-4DCD-81E0-02D09C800CCA}"/>
+              </a:ext>
+            </a:extLst>
+          </p:cNvPr>
+          <p:cNvCxnSpPr>
+            <a:cxnSpLocks/>
+            <a:stCxn id="5" idx="3"/>
+            <a:endCxn id="15" idx="1"/>
+          </p:cNvCxnSpPr>
+          <p:nvPr/>
+        </p:nvCxnSpPr>
+        <p:spPr>
+          <a:xfrm flipV="1">
+            <a:off x="6028141" y="3848424"/>
+            <a:ext cx="633017" cy="1"/>
+          </a:xfrm>
+          <a:prstGeom prst="bentConnector3">
+            <a:avLst/>
+          </a:prstGeom>
+          <a:ln w="19050">
+            <a:tailEnd type="triangle"/>
+          </a:ln>
+        </p:spPr>
+        <p:style>
+          <a:lnRef idx="1">
+            <a:schemeClr val="accent1"/>
+          </a:lnRef>
+          <a:fillRef idx="0">
+            <a:schemeClr val="accent1"/>
+          </a:fillRef>
+          <a:effectRef idx="0">
+            <a:schemeClr val="accent1"/>
+          </a:effectRef>
+          <a:fontRef idx="minor">
+            <a:schemeClr val="tx1"/>
+          </a:fontRef>
+        </p:style>
+      </p:cxnSp>
+      <p:cxnSp>
+        <p:nvCxnSpPr>
+          <p:cNvPr id="49" name="Connector: Elbow 48">
+            <a:extLst>
+              <a:ext uri="{FF2B5EF4-FFF2-40B4-BE49-F238E27FC236}">
+                <a16:creationId xmlns:a16="http://schemas.microsoft.com/office/drawing/2014/main" id="{BE866384-09C3-4639-AD6C-6FF0970B1E10}"/>
+              </a:ext>
+            </a:extLst>
+          </p:cNvPr>
+          <p:cNvCxnSpPr>
+            <a:cxnSpLocks/>
+            <a:stCxn id="15" idx="3"/>
+            <a:endCxn id="7" idx="1"/>
+          </p:cNvCxnSpPr>
+          <p:nvPr/>
+        </p:nvCxnSpPr>
+        <p:spPr>
+          <a:xfrm>
+            <a:off x="7148467" y="3848424"/>
+            <a:ext cx="629641" cy="1"/>
+          </a:xfrm>
+          <a:prstGeom prst="bentConnector3">
+            <a:avLst/>
+          </a:prstGeom>
+          <a:ln w="19050">
+            <a:tailEnd type="triangle"/>
+          </a:ln>
+        </p:spPr>
+        <p:style>
+          <a:lnRef idx="1">
+            <a:schemeClr val="accent1"/>
+          </a:lnRef>
+          <a:fillRef idx="0">
+            <a:schemeClr val="accent1"/>
+          </a:fillRef>
+          <a:effectRef idx="0">
+            <a:schemeClr val="accent1"/>
+          </a:effectRef>
+          <a:fontRef idx="minor">
+            <a:schemeClr val="tx1"/>
+          </a:fontRef>
+        </p:style>
+      </p:cxnSp>
+      <p:cxnSp>
+        <p:nvCxnSpPr>
+          <p:cNvPr id="52" name="Connector: Elbow 51">
+            <a:extLst>
+              <a:ext uri="{FF2B5EF4-FFF2-40B4-BE49-F238E27FC236}">
+                <a16:creationId xmlns:a16="http://schemas.microsoft.com/office/drawing/2014/main" id="{51FBE17A-19D2-4059-9AEC-80D2E90782F3}"/>
+              </a:ext>
+            </a:extLst>
+          </p:cNvPr>
+          <p:cNvCxnSpPr>
+            <a:cxnSpLocks/>
+            <a:stCxn id="7" idx="3"/>
+            <a:endCxn id="13" idx="1"/>
+          </p:cNvCxnSpPr>
+          <p:nvPr/>
+        </p:nvCxnSpPr>
+        <p:spPr>
+          <a:xfrm flipV="1">
+            <a:off x="8321747" y="3848424"/>
+            <a:ext cx="629639" cy="1"/>
+          </a:xfrm>
+          <a:prstGeom prst="bentConnector3">
+            <a:avLst/>
+          </a:prstGeom>
+          <a:ln w="19050">
+            <a:tailEnd type="triangle"/>
+          </a:ln>
+        </p:spPr>
+        <p:style>
+          <a:lnRef idx="1">
+            <a:schemeClr val="accent1"/>
+          </a:lnRef>
+          <a:fillRef idx="0">
+            <a:schemeClr val="accent1"/>
+          </a:fillRef>
+          <a:effectRef idx="0">
+            <a:schemeClr val="accent1"/>
+          </a:effectRef>
+          <a:fontRef idx="minor">
+            <a:schemeClr val="tx1"/>
+          </a:fontRef>
+        </p:style>
+      </p:cxnSp>
+      <p:cxnSp>
+        <p:nvCxnSpPr>
+          <p:cNvPr id="55" name="Connector: Elbow 54">
+            <a:extLst>
+              <a:ext uri="{FF2B5EF4-FFF2-40B4-BE49-F238E27FC236}">
+                <a16:creationId xmlns:a16="http://schemas.microsoft.com/office/drawing/2014/main" id="{EFFA708D-7852-416E-AD1E-7E458A65563B}"/>
+              </a:ext>
+            </a:extLst>
+          </p:cNvPr>
+          <p:cNvCxnSpPr>
+            <a:stCxn id="4" idx="2"/>
+            <a:endCxn id="18" idx="1"/>
+          </p:cNvCxnSpPr>
+          <p:nvPr/>
+        </p:nvCxnSpPr>
+        <p:spPr>
+          <a:xfrm rot="16200000" flipH="1">
+            <a:off x="5857660" y="4440325"/>
+            <a:ext cx="675553" cy="839593"/>
+          </a:xfrm>
+          <a:prstGeom prst="bentConnector2">
+            <a:avLst/>
+          </a:prstGeom>
+          <a:ln w="9525" cap="flat" cmpd="sng" algn="ctr">
+            <a:solidFill>
+              <a:schemeClr val="accent2"/>
+            </a:solidFill>
+            <a:prstDash val="dash"/>
+            <a:round/>
+            <a:headEnd type="none" w="med" len="med"/>
+            <a:tailEnd type="none" w="med" len="med"/>
+          </a:ln>
+        </p:spPr>
+        <p:style>
+          <a:lnRef idx="0">
+            <a:scrgbClr r="0" g="0" b="0"/>
+          </a:lnRef>
+          <a:fillRef idx="0">
+            <a:scrgbClr r="0" g="0" b="0"/>
+          </a:fillRef>
+          <a:effectRef idx="0">
+            <a:scrgbClr r="0" g="0" b="0"/>
+          </a:effectRef>
+          <a:fontRef idx="minor">
+            <a:schemeClr val="tx1"/>
+          </a:fontRef>
+        </p:style>
+      </p:cxnSp>
+      <p:cxnSp>
+        <p:nvCxnSpPr>
+          <p:cNvPr id="56" name="Connector: Elbow 55">
+            <a:extLst>
+              <a:ext uri="{FF2B5EF4-FFF2-40B4-BE49-F238E27FC236}">
+                <a16:creationId xmlns:a16="http://schemas.microsoft.com/office/drawing/2014/main" id="{75CFCD9B-C8F9-4D53-8B82-8F2AFA11E19D}"/>
+              </a:ext>
+            </a:extLst>
+          </p:cNvPr>
+          <p:cNvCxnSpPr>
+            <a:cxnSpLocks/>
+            <a:stCxn id="6" idx="2"/>
+            <a:endCxn id="18" idx="3"/>
+          </p:cNvCxnSpPr>
+          <p:nvPr/>
+        </p:nvCxnSpPr>
+        <p:spPr>
+          <a:xfrm rot="5400000">
+            <a:off x="7261421" y="4409392"/>
+            <a:ext cx="675553" cy="901460"/>
+          </a:xfrm>
+          <a:prstGeom prst="bentConnector2">
+            <a:avLst/>
+          </a:prstGeom>
+          <a:ln w="9525" cap="flat" cmpd="sng" algn="ctr">
+            <a:solidFill>
+              <a:schemeClr val="accent2"/>
+            </a:solidFill>
+            <a:prstDash val="dash"/>
+            <a:round/>
+            <a:headEnd type="none" w="med" len="med"/>
+            <a:tailEnd type="none" w="med" len="med"/>
+          </a:ln>
+        </p:spPr>
+        <p:style>
+          <a:lnRef idx="0">
+            <a:scrgbClr r="0" g="0" b="0"/>
+          </a:lnRef>
+          <a:fillRef idx="0">
+            <a:scrgbClr r="0" g="0" b="0"/>
+          </a:fillRef>
+          <a:effectRef idx="0">
+            <a:scrgbClr r="0" g="0" b="0"/>
+          </a:effectRef>
+          <a:fontRef idx="minor">
+            <a:schemeClr val="tx1"/>
+          </a:fontRef>
+        </p:style>
+      </p:cxnSp>
+      <p:pic>
+        <p:nvPicPr>
+          <p:cNvPr id="59" name="Picture 58">
+            <a:extLst>
+              <a:ext uri="{FF2B5EF4-FFF2-40B4-BE49-F238E27FC236}">
+                <a16:creationId xmlns:a16="http://schemas.microsoft.com/office/drawing/2014/main" id="{03F3E81C-920E-481A-8C88-5E7F8DB3D013}"/>
+              </a:ext>
+            </a:extLst>
+          </p:cNvPr>
+          <p:cNvPicPr>
+            <a:picLocks noChangeAspect="1"/>
+          </p:cNvPicPr>
+          <p:nvPr/>
+        </p:nvPicPr>
+        <p:blipFill>
+          <a:blip r:embed="rId9">
+            <a:extLst>
+              <a:ext uri="{28A0092B-C50C-407E-A947-70E740481C1C}">
+                <a14:useLocalDpi xmlns:a14="http://schemas.microsoft.com/office/drawing/2010/main" val="0"/>
+              </a:ext>
+            </a:extLst>
+          </a:blip>
+          <a:stretch>
+            <a:fillRect/>
+          </a:stretch>
+        </p:blipFill>
+        <p:spPr>
+          <a:xfrm>
+            <a:off x="1684936" y="3407402"/>
+            <a:ext cx="731520" cy="731520"/>
+          </a:xfrm>
+          <a:prstGeom prst="rect">
+            <a:avLst/>
+          </a:prstGeom>
+        </p:spPr>
+      </p:pic>
+      <p:pic>
+        <p:nvPicPr>
+          <p:cNvPr id="60" name="Picture 59">
+            <a:extLst>
+              <a:ext uri="{FF2B5EF4-FFF2-40B4-BE49-F238E27FC236}">
+                <a16:creationId xmlns:a16="http://schemas.microsoft.com/office/drawing/2014/main" id="{7265E07C-3585-481A-99FF-99728D504060}"/>
+              </a:ext>
+            </a:extLst>
+          </p:cNvPr>
+          <p:cNvPicPr>
+            <a:picLocks noChangeAspect="1"/>
+          </p:cNvPicPr>
+          <p:nvPr/>
+        </p:nvPicPr>
+        <p:blipFill>
+          <a:blip r:embed="rId10">
+            <a:extLst>
+              <a:ext uri="{28A0092B-C50C-407E-A947-70E740481C1C}">
+                <a14:useLocalDpi xmlns:a14="http://schemas.microsoft.com/office/drawing/2010/main" val="0"/>
+              </a:ext>
+            </a:extLst>
+          </a:blip>
+          <a:stretch>
+            <a:fillRect/>
+          </a:stretch>
+        </p:blipFill>
+        <p:spPr>
+          <a:xfrm>
+            <a:off x="1696063" y="2061991"/>
+            <a:ext cx="709267" cy="701253"/>
+          </a:xfrm>
+          <a:prstGeom prst="rect">
+            <a:avLst/>
+          </a:prstGeom>
+        </p:spPr>
+      </p:pic>
+      <p:cxnSp>
+        <p:nvCxnSpPr>
+          <p:cNvPr id="64" name="Straight Arrow Connector 63">
+            <a:extLst>
+              <a:ext uri="{FF2B5EF4-FFF2-40B4-BE49-F238E27FC236}">
+                <a16:creationId xmlns:a16="http://schemas.microsoft.com/office/drawing/2014/main" id="{7F8C7449-7C9C-4555-9239-83CCAAD6D6B5}"/>
+              </a:ext>
+            </a:extLst>
+          </p:cNvPr>
+          <p:cNvCxnSpPr>
+            <a:cxnSpLocks/>
+            <a:stCxn id="59" idx="0"/>
+            <a:endCxn id="60" idx="2"/>
+          </p:cNvCxnSpPr>
+          <p:nvPr/>
+        </p:nvCxnSpPr>
+        <p:spPr>
+          <a:xfrm flipV="1">
+            <a:off x="2050696" y="2763244"/>
+            <a:ext cx="1" cy="644158"/>
+          </a:xfrm>
+          <a:prstGeom prst="straightConnector1">
+            <a:avLst/>
+          </a:prstGeom>
+          <a:ln>
+            <a:tailEnd type="triangle"/>
+          </a:ln>
+        </p:spPr>
+        <p:style>
+          <a:lnRef idx="2">
+            <a:schemeClr val="dk1"/>
+          </a:lnRef>
+          <a:fillRef idx="0">
+            <a:schemeClr val="dk1"/>
+          </a:fillRef>
+          <a:effectRef idx="1">
+            <a:schemeClr val="dk1"/>
+          </a:effectRef>
+          <a:fontRef idx="minor">
+            <a:schemeClr val="tx1"/>
+          </a:fontRef>
+        </p:style>
+      </p:cxnSp>
+      <p:cxnSp>
+        <p:nvCxnSpPr>
+          <p:cNvPr id="68" name="Straight Arrow Connector 67">
+            <a:extLst>
+              <a:ext uri="{FF2B5EF4-FFF2-40B4-BE49-F238E27FC236}">
+                <a16:creationId xmlns:a16="http://schemas.microsoft.com/office/drawing/2014/main" id="{24AAE996-960B-43C8-B562-D6172070663B}"/>
+              </a:ext>
+            </a:extLst>
+          </p:cNvPr>
+          <p:cNvCxnSpPr>
+            <a:cxnSpLocks/>
+            <a:stCxn id="60" idx="3"/>
+            <a:endCxn id="11" idx="1"/>
+          </p:cNvCxnSpPr>
+          <p:nvPr/>
+        </p:nvCxnSpPr>
+        <p:spPr>
+          <a:xfrm>
+            <a:off x="2405330" y="2412618"/>
+            <a:ext cx="1965598" cy="0"/>
+          </a:xfrm>
+          <a:prstGeom prst="straightConnector1">
+            <a:avLst/>
+          </a:prstGeom>
+          <a:ln>
+            <a:tailEnd type="triangle"/>
+          </a:ln>
+        </p:spPr>
+        <p:style>
+          <a:lnRef idx="2">
+            <a:schemeClr val="dk1"/>
+          </a:lnRef>
+          <a:fillRef idx="0">
+            <a:schemeClr val="dk1"/>
+          </a:fillRef>
+          <a:effectRef idx="1">
+            <a:schemeClr val="dk1"/>
+          </a:effectRef>
+          <a:fontRef idx="minor">
+            <a:schemeClr val="tx1"/>
+          </a:fontRef>
+        </p:style>
+      </p:cxnSp>
+    </p:spTree>
+    <p:extLst>
+      <p:ext uri="{BB962C8B-B14F-4D97-AF65-F5344CB8AC3E}">
+        <p14:creationId xmlns:p14="http://schemas.microsoft.com/office/powerpoint/2010/main" val="1761302454"/>
+      </p:ext>
+    </p:extLst>
+  </p:cSld>
+  <p:clrMapOvr>
+    <a:masterClrMapping/>
+  </p:clrMapOvr>
+</p:sld>
+</file>
+
+<file path=ppt/slides/slide5.xml><?xml version="1.0" encoding="utf-8"?>
 <p:sld xmlns:a="http://schemas.openxmlformats.org/drawingml/2006/main" xmlns:r="http://schemas.openxmlformats.org/officeDocument/2006/relationships" xmlns:p="http://schemas.openxmlformats.org/presentationml/2006/main">
   <p:cSld>
     <p:spTree>
@@ -12873,16 +14974,12 @@
               <a:buNone/>
             </a:pPr>
             <a:r>
-              <a:rPr lang="en-US" dirty="0" err="1"/>
+              <a:rPr lang="en-US" i="1" dirty="0" err="1"/>
               <a:t>recognizeCelebrities</a:t>
             </a:r>
             <a:r>
-              <a:rPr lang="en-US"/>
-              <a:t> API does </a:t>
-            </a:r>
-            <a:r>
               <a:rPr lang="en-US" dirty="0"/>
-              <a:t>facial recognition and compares faces with AWS’s celebrity face-collection (provides Name and imdb.com </a:t>
+              <a:t> API does facial recognition and compares faces with AWS’s celebrity face-collection (provides Name and imdb.com </a:t>
             </a:r>
             <a:r>
               <a:rPr lang="en-US" dirty="0" err="1"/>
@@ -12910,7 +15007,7 @@
           <p:nvPr/>
         </p:nvPicPr>
         <p:blipFill>
-          <a:blip r:embed="rId2"/>
+          <a:blip r:embed="rId3"/>
           <a:stretch>
             <a:fillRect/>
           </a:stretch>
@@ -12938,7 +15035,7 @@
 </p:sld>
 </file>
 
-<file path=ppt/slides/slide5.xml><?xml version="1.0" encoding="utf-8"?>
+<file path=ppt/slides/slide6.xml><?xml version="1.0" encoding="utf-8"?>
 <p:sld xmlns:a="http://schemas.openxmlformats.org/drawingml/2006/main" xmlns:r="http://schemas.openxmlformats.org/officeDocument/2006/relationships" xmlns:p="http://schemas.openxmlformats.org/presentationml/2006/main">
   <p:cSld>
     <p:spTree>
@@ -13073,7 +15170,7 @@
           <a:p>
             <a:r>
               <a:rPr lang="en-US" dirty="0"/>
-              <a:t>Update webpages </a:t>
+              <a:t>Combine webpages </a:t>
             </a:r>
             <a:r>
               <a:rPr lang="en-US" i="1" dirty="0"/>
@@ -13123,7 +15220,7 @@
 </p:sld>
 </file>
 
-<file path=ppt/slides/slide6.xml><?xml version="1.0" encoding="utf-8"?>
+<file path=ppt/slides/slide7.xml><?xml version="1.0" encoding="utf-8"?>
 <p:sld xmlns:a="http://schemas.openxmlformats.org/drawingml/2006/main" xmlns:r="http://schemas.openxmlformats.org/officeDocument/2006/relationships" xmlns:p="http://schemas.openxmlformats.org/presentationml/2006/main">
   <p:cSld>
     <p:spTree>
@@ -13195,7 +15292,7 @@
             </a:r>
             <a:r>
               <a:rPr lang="en-US" dirty="0">
-                <a:hlinkClick r:id="rId2"/>
+                <a:hlinkClick r:id="rId3"/>
               </a:rPr>
               <a:t>http://benjaminsklar-celebrity-images.s3-website-us-east-1.amazonaws.com</a:t>
             </a:r>
@@ -13205,26 +15302,59 @@
             <a:r>
               <a:rPr lang="en-US" dirty="0"/>
               <a:t>Source: </a:t>
-            </a:r>
-            <a:r>
-              <a:rPr lang="en-US" dirty="0">
-                <a:hlinkClick r:id="rId3"/>
-              </a:rPr>
-              <a:t>https://github.com/brskl/Cloud230B_final</a:t>
-            </a:r>
-            <a:endParaRPr lang="en-US" dirty="0"/>
-          </a:p>
-          <a:p>
-            <a:r>
-              <a:rPr lang="en-US" dirty="0"/>
-              <a:t>AWS Documentation: </a:t>
             </a:r>
             <a:r>
               <a:rPr lang="en-US" dirty="0">
                 <a:hlinkClick r:id="rId4"/>
               </a:rPr>
+              <a:t>https://github.com/brskl/Cloud230B_final</a:t>
+            </a:r>
+            <a:endParaRPr lang="en-US" dirty="0"/>
+          </a:p>
+          <a:p>
+            <a:r>
+              <a:rPr lang="en-US" dirty="0"/>
+              <a:t>AWS Documentation: </a:t>
+            </a:r>
+            <a:r>
+              <a:rPr lang="en-US" dirty="0">
+                <a:hlinkClick r:id="rId5"/>
+              </a:rPr>
               <a:t>https://aws.amazon.com/rekognition/</a:t>
             </a:r>
+            <a:endParaRPr lang="en-US" dirty="0"/>
+          </a:p>
+          <a:p>
+            <a:r>
+              <a:rPr lang="en-US" dirty="0"/>
+              <a:t>Competition:</a:t>
+            </a:r>
+          </a:p>
+          <a:p>
+            <a:pPr lvl="1"/>
+            <a:r>
+              <a:rPr lang="en-US" dirty="0">
+                <a:hlinkClick r:id="rId6"/>
+              </a:rPr>
+              <a:t>https://azure.microsoft.com/en-us/services/cognitive-services/face/</a:t>
+            </a:r>
+            <a:endParaRPr lang="en-US" dirty="0"/>
+          </a:p>
+          <a:p>
+            <a:pPr lvl="1"/>
+            <a:r>
+              <a:rPr lang="en-US" dirty="0">
+                <a:hlinkClick r:id="rId7"/>
+              </a:rPr>
+              <a:t>https://cloud.google.com/vision/</a:t>
+            </a:r>
+            <a:r>
+              <a:rPr lang="en-US" dirty="0"/>
+              <a:t> </a:t>
+            </a:r>
+          </a:p>
+          <a:p>
+            <a:pPr lvl="1"/>
             <a:endParaRPr lang="en-US" dirty="0"/>
           </a:p>
         </p:txBody>
@@ -13491,4 +15621,299 @@
     </a:ext>
   </a:extLst>
 </a:theme>
+</file>
+
+<file path=ppt/theme/theme2.xml><?xml version="1.0" encoding="utf-8"?>
+<a:theme xmlns:a="http://schemas.openxmlformats.org/drawingml/2006/main" name="Office Theme">
+  <a:themeElements>
+    <a:clrScheme name="Office">
+      <a:dk1>
+        <a:sysClr val="windowText" lastClr="000000"/>
+      </a:dk1>
+      <a:lt1>
+        <a:sysClr val="window" lastClr="FFFFFF"/>
+      </a:lt1>
+      <a:dk2>
+        <a:srgbClr val="44546A"/>
+      </a:dk2>
+      <a:lt2>
+        <a:srgbClr val="E7E6E6"/>
+      </a:lt2>
+      <a:accent1>
+        <a:srgbClr val="4472C4"/>
+      </a:accent1>
+      <a:accent2>
+        <a:srgbClr val="ED7D31"/>
+      </a:accent2>
+      <a:accent3>
+        <a:srgbClr val="A5A5A5"/>
+      </a:accent3>
+      <a:accent4>
+        <a:srgbClr val="FFC000"/>
+      </a:accent4>
+      <a:accent5>
+        <a:srgbClr val="5B9BD5"/>
+      </a:accent5>
+      <a:accent6>
+        <a:srgbClr val="70AD47"/>
+      </a:accent6>
+      <a:hlink>
+        <a:srgbClr val="0563C1"/>
+      </a:hlink>
+      <a:folHlink>
+        <a:srgbClr val="954F72"/>
+      </a:folHlink>
+    </a:clrScheme>
+    <a:fontScheme name="Office">
+      <a:majorFont>
+        <a:latin typeface="Calibri Light" panose="020F0302020204030204"/>
+        <a:ea typeface=""/>
+        <a:cs typeface=""/>
+        <a:font script="Jpan" typeface="游ゴシック Light"/>
+        <a:font script="Hang" typeface="맑은 고딕"/>
+        <a:font script="Hans" typeface="等线 Light"/>
+        <a:font script="Hant" typeface="新細明體"/>
+        <a:font script="Arab" typeface="Times New Roman"/>
+        <a:font script="Hebr" typeface="Times New Roman"/>
+        <a:font script="Thai" typeface="Angsana New"/>
+        <a:font script="Ethi" typeface="Nyala"/>
+        <a:font script="Beng" typeface="Vrinda"/>
+        <a:font script="Gujr" typeface="Shruti"/>
+        <a:font script="Khmr" typeface="MoolBoran"/>
+        <a:font script="Knda" typeface="Tunga"/>
+        <a:font script="Guru" typeface="Raavi"/>
+        <a:font script="Cans" typeface="Euphemia"/>
+        <a:font script="Cher" typeface="Plantagenet Cherokee"/>
+        <a:font script="Yiii" typeface="Microsoft Yi Baiti"/>
+        <a:font script="Tibt" typeface="Microsoft Himalaya"/>
+        <a:font script="Thaa" typeface="MV Boli"/>
+        <a:font script="Deva" typeface="Mangal"/>
+        <a:font script="Telu" typeface="Gautami"/>
+        <a:font script="Taml" typeface="Latha"/>
+        <a:font script="Syrc" typeface="Estrangelo Edessa"/>
+        <a:font script="Orya" typeface="Kalinga"/>
+        <a:font script="Mlym" typeface="Kartika"/>
+        <a:font script="Laoo" typeface="DokChampa"/>
+        <a:font script="Sinh" typeface="Iskoola Pota"/>
+        <a:font script="Mong" typeface="Mongolian Baiti"/>
+        <a:font script="Viet" typeface="Times New Roman"/>
+        <a:font script="Uigh" typeface="Microsoft Uighur"/>
+        <a:font script="Geor" typeface="Sylfaen"/>
+        <a:font script="Armn" typeface="Arial"/>
+        <a:font script="Bugi" typeface="Leelawadee UI"/>
+        <a:font script="Bopo" typeface="Microsoft JhengHei"/>
+        <a:font script="Java" typeface="Javanese Text"/>
+        <a:font script="Lisu" typeface="Segoe UI"/>
+        <a:font script="Mymr" typeface="Myanmar Text"/>
+        <a:font script="Nkoo" typeface="Ebrima"/>
+        <a:font script="Olck" typeface="Nirmala UI"/>
+        <a:font script="Osma" typeface="Ebrima"/>
+        <a:font script="Phag" typeface="Phagspa"/>
+        <a:font script="Syrn" typeface="Estrangelo Edessa"/>
+        <a:font script="Syrj" typeface="Estrangelo Edessa"/>
+        <a:font script="Syre" typeface="Estrangelo Edessa"/>
+        <a:font script="Sora" typeface="Nirmala UI"/>
+        <a:font script="Tale" typeface="Microsoft Tai Le"/>
+        <a:font script="Talu" typeface="Microsoft New Tai Lue"/>
+        <a:font script="Tfng" typeface="Ebrima"/>
+      </a:majorFont>
+      <a:minorFont>
+        <a:latin typeface="Calibri" panose="020F0502020204030204"/>
+        <a:ea typeface=""/>
+        <a:cs typeface=""/>
+        <a:font script="Jpan" typeface="游ゴシック"/>
+        <a:font script="Hang" typeface="맑은 고딕"/>
+        <a:font script="Hans" typeface="等线"/>
+        <a:font script="Hant" typeface="新細明體"/>
+        <a:font script="Arab" typeface="Arial"/>
+        <a:font script="Hebr" typeface="Arial"/>
+        <a:font script="Thai" typeface="Cordia New"/>
+        <a:font script="Ethi" typeface="Nyala"/>
+        <a:font script="Beng" typeface="Vrinda"/>
+        <a:font script="Gujr" typeface="Shruti"/>
+        <a:font script="Khmr" typeface="DaunPenh"/>
+        <a:font script="Knda" typeface="Tunga"/>
+        <a:font script="Guru" typeface="Raavi"/>
+        <a:font script="Cans" typeface="Euphemia"/>
+        <a:font script="Cher" typeface="Plantagenet Cherokee"/>
+        <a:font script="Yiii" typeface="Microsoft Yi Baiti"/>
+        <a:font script="Tibt" typeface="Microsoft Himalaya"/>
+        <a:font script="Thaa" typeface="MV Boli"/>
+        <a:font script="Deva" typeface="Mangal"/>
+        <a:font script="Telu" typeface="Gautami"/>
+        <a:font script="Taml" typeface="Latha"/>
+        <a:font script="Syrc" typeface="Estrangelo Edessa"/>
+        <a:font script="Orya" typeface="Kalinga"/>
+        <a:font script="Mlym" typeface="Kartika"/>
+        <a:font script="Laoo" typeface="DokChampa"/>
+        <a:font script="Sinh" typeface="Iskoola Pota"/>
+        <a:font script="Mong" typeface="Mongolian Baiti"/>
+        <a:font script="Viet" typeface="Arial"/>
+        <a:font script="Uigh" typeface="Microsoft Uighur"/>
+        <a:font script="Geor" typeface="Sylfaen"/>
+        <a:font script="Armn" typeface="Arial"/>
+        <a:font script="Bugi" typeface="Leelawadee UI"/>
+        <a:font script="Bopo" typeface="Microsoft JhengHei"/>
+        <a:font script="Java" typeface="Javanese Text"/>
+        <a:font script="Lisu" typeface="Segoe UI"/>
+        <a:font script="Mymr" typeface="Myanmar Text"/>
+        <a:font script="Nkoo" typeface="Ebrima"/>
+        <a:font script="Olck" typeface="Nirmala UI"/>
+        <a:font script="Osma" typeface="Ebrima"/>
+        <a:font script="Phag" typeface="Phagspa"/>
+        <a:font script="Syrn" typeface="Estrangelo Edessa"/>
+        <a:font script="Syrj" typeface="Estrangelo Edessa"/>
+        <a:font script="Syre" typeface="Estrangelo Edessa"/>
+        <a:font script="Sora" typeface="Nirmala UI"/>
+        <a:font script="Tale" typeface="Microsoft Tai Le"/>
+        <a:font script="Talu" typeface="Microsoft New Tai Lue"/>
+        <a:font script="Tfng" typeface="Ebrima"/>
+      </a:minorFont>
+    </a:fontScheme>
+    <a:fmtScheme name="Office">
+      <a:fillStyleLst>
+        <a:solidFill>
+          <a:schemeClr val="phClr"/>
+        </a:solidFill>
+        <a:gradFill rotWithShape="1">
+          <a:gsLst>
+            <a:gs pos="0">
+              <a:schemeClr val="phClr">
+                <a:lumMod val="110000"/>
+                <a:satMod val="105000"/>
+                <a:tint val="67000"/>
+              </a:schemeClr>
+            </a:gs>
+            <a:gs pos="50000">
+              <a:schemeClr val="phClr">
+                <a:lumMod val="105000"/>
+                <a:satMod val="103000"/>
+                <a:tint val="73000"/>
+              </a:schemeClr>
+            </a:gs>
+            <a:gs pos="100000">
+              <a:schemeClr val="phClr">
+                <a:lumMod val="105000"/>
+                <a:satMod val="109000"/>
+                <a:tint val="81000"/>
+              </a:schemeClr>
+            </a:gs>
+          </a:gsLst>
+          <a:lin ang="5400000" scaled="0"/>
+        </a:gradFill>
+        <a:gradFill rotWithShape="1">
+          <a:gsLst>
+            <a:gs pos="0">
+              <a:schemeClr val="phClr">
+                <a:satMod val="103000"/>
+                <a:lumMod val="102000"/>
+                <a:tint val="94000"/>
+              </a:schemeClr>
+            </a:gs>
+            <a:gs pos="50000">
+              <a:schemeClr val="phClr">
+                <a:satMod val="110000"/>
+                <a:lumMod val="100000"/>
+                <a:shade val="100000"/>
+              </a:schemeClr>
+            </a:gs>
+            <a:gs pos="100000">
+              <a:schemeClr val="phClr">
+                <a:lumMod val="99000"/>
+                <a:satMod val="120000"/>
+                <a:shade val="78000"/>
+              </a:schemeClr>
+            </a:gs>
+          </a:gsLst>
+          <a:lin ang="5400000" scaled="0"/>
+        </a:gradFill>
+      </a:fillStyleLst>
+      <a:lnStyleLst>
+        <a:ln w="6350" cap="flat" cmpd="sng" algn="ctr">
+          <a:solidFill>
+            <a:schemeClr val="phClr"/>
+          </a:solidFill>
+          <a:prstDash val="solid"/>
+          <a:miter lim="800000"/>
+        </a:ln>
+        <a:ln w="12700" cap="flat" cmpd="sng" algn="ctr">
+          <a:solidFill>
+            <a:schemeClr val="phClr"/>
+          </a:solidFill>
+          <a:prstDash val="solid"/>
+          <a:miter lim="800000"/>
+        </a:ln>
+        <a:ln w="19050" cap="flat" cmpd="sng" algn="ctr">
+          <a:solidFill>
+            <a:schemeClr val="phClr"/>
+          </a:solidFill>
+          <a:prstDash val="solid"/>
+          <a:miter lim="800000"/>
+        </a:ln>
+      </a:lnStyleLst>
+      <a:effectStyleLst>
+        <a:effectStyle>
+          <a:effectLst/>
+        </a:effectStyle>
+        <a:effectStyle>
+          <a:effectLst/>
+        </a:effectStyle>
+        <a:effectStyle>
+          <a:effectLst>
+            <a:outerShdw blurRad="57150" dist="19050" dir="5400000" algn="ctr" rotWithShape="0">
+              <a:srgbClr val="000000">
+                <a:alpha val="63000"/>
+              </a:srgbClr>
+            </a:outerShdw>
+          </a:effectLst>
+        </a:effectStyle>
+      </a:effectStyleLst>
+      <a:bgFillStyleLst>
+        <a:solidFill>
+          <a:schemeClr val="phClr"/>
+        </a:solidFill>
+        <a:solidFill>
+          <a:schemeClr val="phClr">
+            <a:tint val="95000"/>
+            <a:satMod val="170000"/>
+          </a:schemeClr>
+        </a:solidFill>
+        <a:gradFill rotWithShape="1">
+          <a:gsLst>
+            <a:gs pos="0">
+              <a:schemeClr val="phClr">
+                <a:tint val="93000"/>
+                <a:satMod val="150000"/>
+                <a:shade val="98000"/>
+                <a:lumMod val="102000"/>
+              </a:schemeClr>
+            </a:gs>
+            <a:gs pos="50000">
+              <a:schemeClr val="phClr">
+                <a:tint val="98000"/>
+                <a:satMod val="130000"/>
+                <a:shade val="90000"/>
+                <a:lumMod val="103000"/>
+              </a:schemeClr>
+            </a:gs>
+            <a:gs pos="100000">
+              <a:schemeClr val="phClr">
+                <a:shade val="63000"/>
+                <a:satMod val="120000"/>
+              </a:schemeClr>
+            </a:gs>
+          </a:gsLst>
+          <a:lin ang="5400000" scaled="0"/>
+        </a:gradFill>
+      </a:bgFillStyleLst>
+    </a:fmtScheme>
+  </a:themeElements>
+  <a:objectDefaults/>
+  <a:extraClrSchemeLst/>
+  <a:extLst>
+    <a:ext uri="{05A4C25C-085E-4340-85A3-A5531E510DB2}">
+      <thm15:themeFamily xmlns:thm15="http://schemas.microsoft.com/office/thememl/2012/main" name="Office Theme" id="{62F939B6-93AF-4DB8-9C6B-D6C7DFDC589F}" vid="{4A3C46E8-61CC-4603-A589-7422A47A8E4A}"/>
+    </a:ext>
+  </a:extLst>
+</a:theme>
 </file>
</xml_diff>